<commit_message>
Added proposal of questions Tried menu (fail)
</commit_message>
<xml_diff>
--- a/Docs/Survive Axon Demo v2.pptx
+++ b/Docs/Survive Axon Demo v2.pptx
@@ -13,10 +13,9 @@
     <p:sldId id="276" r:id="rId7"/>
     <p:sldId id="275" r:id="rId8"/>
     <p:sldId id="268" r:id="rId9"/>
-    <p:sldId id="277" r:id="rId10"/>
-    <p:sldId id="278" r:id="rId11"/>
-    <p:sldId id="274" r:id="rId12"/>
-    <p:sldId id="270" r:id="rId13"/>
+    <p:sldId id="278" r:id="rId10"/>
+    <p:sldId id="274" r:id="rId11"/>
+    <p:sldId id="270" r:id="rId12"/>
   </p:sldIdLst>
   <p:sldSz cx="12192000" cy="6858000"/>
   <p:notesSz cx="6858000" cy="9144000"/>
@@ -117,7 +116,7 @@
   </p:defaultTextStyle>
   <p:extLst>
     <p:ext uri="{EFAFB233-063F-42B5-8137-9DF3F51BA10A}">
-      <p15:sldGuideLst xmlns="" xmlns:p15="http://schemas.microsoft.com/office/powerpoint/2012/main"/>
+      <p15:sldGuideLst xmlns:p15="http://schemas.microsoft.com/office/powerpoint/2012/main" xmlns=""/>
     </p:ext>
   </p:extLst>
 </p:presentation>
@@ -128,7 +127,7 @@
   <p:cmAuthor id="1" name="Patrick M" initials="PM" lastIdx="1" clrIdx="0">
     <p:extLst>
       <p:ext uri="{19B8F6BF-5375-455C-9EA6-DF929625EA0E}">
-        <p15:presenceInfo xmlns="" xmlns:p15="http://schemas.microsoft.com/office/powerpoint/2012/main" userId="293365ab57c4ddb0" providerId="Windows Live"/>
+        <p15:presenceInfo xmlns:p15="http://schemas.microsoft.com/office/powerpoint/2012/main" xmlns="" userId="293365ab57c4ddb0" providerId="Windows Live"/>
       </p:ext>
     </p:extLst>
   </p:cmAuthor>
@@ -265,7 +264,7 @@
             <a:fld id="{37724C19-980F-4321-AACF-69E1510F1043}" type="datetimeFigureOut">
               <a:rPr lang="en-US" smtClean="0"/>
               <a:pPr/>
-              <a:t>11/15/2016</a:t>
+              <a:t>11/21/2016</a:t>
             </a:fld>
             <a:endParaRPr lang="en-US" dirty="0"/>
           </a:p>
@@ -317,7 +316,7 @@
     </p:spTree>
     <p:extLst>
       <p:ext uri="{BB962C8B-B14F-4D97-AF65-F5344CB8AC3E}">
-        <p14:creationId xmlns="" xmlns:p14="http://schemas.microsoft.com/office/powerpoint/2010/main" val="4276609490"/>
+        <p14:creationId xmlns:p14="http://schemas.microsoft.com/office/powerpoint/2010/main" xmlns="" val="4276609490"/>
       </p:ext>
     </p:extLst>
   </p:cSld>
@@ -435,7 +434,7 @@
             <a:fld id="{37724C19-980F-4321-AACF-69E1510F1043}" type="datetimeFigureOut">
               <a:rPr lang="en-US" smtClean="0"/>
               <a:pPr/>
-              <a:t>11/15/2016</a:t>
+              <a:t>11/21/2016</a:t>
             </a:fld>
             <a:endParaRPr lang="en-US" dirty="0"/>
           </a:p>
@@ -487,7 +486,7 @@
     </p:spTree>
     <p:extLst>
       <p:ext uri="{BB962C8B-B14F-4D97-AF65-F5344CB8AC3E}">
-        <p14:creationId xmlns="" xmlns:p14="http://schemas.microsoft.com/office/powerpoint/2010/main" val="1177722305"/>
+        <p14:creationId xmlns:p14="http://schemas.microsoft.com/office/powerpoint/2010/main" xmlns="" val="1177722305"/>
       </p:ext>
     </p:extLst>
   </p:cSld>
@@ -615,7 +614,7 @@
             <a:fld id="{37724C19-980F-4321-AACF-69E1510F1043}" type="datetimeFigureOut">
               <a:rPr lang="en-US" smtClean="0"/>
               <a:pPr/>
-              <a:t>11/15/2016</a:t>
+              <a:t>11/21/2016</a:t>
             </a:fld>
             <a:endParaRPr lang="en-US" dirty="0"/>
           </a:p>
@@ -667,7 +666,7 @@
     </p:spTree>
     <p:extLst>
       <p:ext uri="{BB962C8B-B14F-4D97-AF65-F5344CB8AC3E}">
-        <p14:creationId xmlns="" xmlns:p14="http://schemas.microsoft.com/office/powerpoint/2010/main" val="3097804831"/>
+        <p14:creationId xmlns:p14="http://schemas.microsoft.com/office/powerpoint/2010/main" xmlns="" val="3097804831"/>
       </p:ext>
     </p:extLst>
   </p:cSld>
@@ -785,7 +784,7 @@
             <a:fld id="{37724C19-980F-4321-AACF-69E1510F1043}" type="datetimeFigureOut">
               <a:rPr lang="en-US" smtClean="0"/>
               <a:pPr/>
-              <a:t>11/15/2016</a:t>
+              <a:t>11/21/2016</a:t>
             </a:fld>
             <a:endParaRPr lang="en-US" dirty="0"/>
           </a:p>
@@ -837,7 +836,7 @@
     </p:spTree>
     <p:extLst>
       <p:ext uri="{BB962C8B-B14F-4D97-AF65-F5344CB8AC3E}">
-        <p14:creationId xmlns="" xmlns:p14="http://schemas.microsoft.com/office/powerpoint/2010/main" val="137394816"/>
+        <p14:creationId xmlns:p14="http://schemas.microsoft.com/office/powerpoint/2010/main" xmlns="" val="137394816"/>
       </p:ext>
     </p:extLst>
   </p:cSld>
@@ -1032,7 +1031,7 @@
             <a:fld id="{37724C19-980F-4321-AACF-69E1510F1043}" type="datetimeFigureOut">
               <a:rPr lang="en-US" smtClean="0"/>
               <a:pPr/>
-              <a:t>11/15/2016</a:t>
+              <a:t>11/21/2016</a:t>
             </a:fld>
             <a:endParaRPr lang="en-US" dirty="0"/>
           </a:p>
@@ -1084,7 +1083,7 @@
     </p:spTree>
     <p:extLst>
       <p:ext uri="{BB962C8B-B14F-4D97-AF65-F5344CB8AC3E}">
-        <p14:creationId xmlns="" xmlns:p14="http://schemas.microsoft.com/office/powerpoint/2010/main" val="3748074609"/>
+        <p14:creationId xmlns:p14="http://schemas.microsoft.com/office/powerpoint/2010/main" xmlns="" val="3748074609"/>
       </p:ext>
     </p:extLst>
   </p:cSld>
@@ -1263,7 +1262,7 @@
             <a:fld id="{37724C19-980F-4321-AACF-69E1510F1043}" type="datetimeFigureOut">
               <a:rPr lang="en-US" smtClean="0"/>
               <a:pPr/>
-              <a:t>11/15/2016</a:t>
+              <a:t>11/21/2016</a:t>
             </a:fld>
             <a:endParaRPr lang="en-US" dirty="0"/>
           </a:p>
@@ -1315,7 +1314,7 @@
     </p:spTree>
     <p:extLst>
       <p:ext uri="{BB962C8B-B14F-4D97-AF65-F5344CB8AC3E}">
-        <p14:creationId xmlns="" xmlns:p14="http://schemas.microsoft.com/office/powerpoint/2010/main" val="1654182424"/>
+        <p14:creationId xmlns:p14="http://schemas.microsoft.com/office/powerpoint/2010/main" xmlns="" val="1654182424"/>
       </p:ext>
     </p:extLst>
   </p:cSld>
@@ -1629,7 +1628,7 @@
             <a:fld id="{37724C19-980F-4321-AACF-69E1510F1043}" type="datetimeFigureOut">
               <a:rPr lang="en-US" smtClean="0"/>
               <a:pPr/>
-              <a:t>11/15/2016</a:t>
+              <a:t>11/21/2016</a:t>
             </a:fld>
             <a:endParaRPr lang="en-US" dirty="0"/>
           </a:p>
@@ -1681,7 +1680,7 @@
     </p:spTree>
     <p:extLst>
       <p:ext uri="{BB962C8B-B14F-4D97-AF65-F5344CB8AC3E}">
-        <p14:creationId xmlns="" xmlns:p14="http://schemas.microsoft.com/office/powerpoint/2010/main" val="4245890323"/>
+        <p14:creationId xmlns:p14="http://schemas.microsoft.com/office/powerpoint/2010/main" xmlns="" val="4245890323"/>
       </p:ext>
     </p:extLst>
   </p:cSld>
@@ -1748,7 +1747,7 @@
             <a:fld id="{37724C19-980F-4321-AACF-69E1510F1043}" type="datetimeFigureOut">
               <a:rPr lang="en-US" smtClean="0"/>
               <a:pPr/>
-              <a:t>11/15/2016</a:t>
+              <a:t>11/21/2016</a:t>
             </a:fld>
             <a:endParaRPr lang="en-US" dirty="0"/>
           </a:p>
@@ -1800,7 +1799,7 @@
     </p:spTree>
     <p:extLst>
       <p:ext uri="{BB962C8B-B14F-4D97-AF65-F5344CB8AC3E}">
-        <p14:creationId xmlns="" xmlns:p14="http://schemas.microsoft.com/office/powerpoint/2010/main" val="4136871283"/>
+        <p14:creationId xmlns:p14="http://schemas.microsoft.com/office/powerpoint/2010/main" xmlns="" val="4136871283"/>
       </p:ext>
     </p:extLst>
   </p:cSld>
@@ -1845,7 +1844,7 @@
             <a:fld id="{37724C19-980F-4321-AACF-69E1510F1043}" type="datetimeFigureOut">
               <a:rPr lang="en-US" smtClean="0"/>
               <a:pPr/>
-              <a:t>11/15/2016</a:t>
+              <a:t>11/21/2016</a:t>
             </a:fld>
             <a:endParaRPr lang="en-US" dirty="0"/>
           </a:p>
@@ -1897,7 +1896,7 @@
     </p:spTree>
     <p:extLst>
       <p:ext uri="{BB962C8B-B14F-4D97-AF65-F5344CB8AC3E}">
-        <p14:creationId xmlns="" xmlns:p14="http://schemas.microsoft.com/office/powerpoint/2010/main" val="2409841877"/>
+        <p14:creationId xmlns:p14="http://schemas.microsoft.com/office/powerpoint/2010/main" xmlns="" val="2409841877"/>
       </p:ext>
     </p:extLst>
   </p:cSld>
@@ -2122,7 +2121,7 @@
             <a:fld id="{37724C19-980F-4321-AACF-69E1510F1043}" type="datetimeFigureOut">
               <a:rPr lang="en-US" smtClean="0"/>
               <a:pPr/>
-              <a:t>11/15/2016</a:t>
+              <a:t>11/21/2016</a:t>
             </a:fld>
             <a:endParaRPr lang="en-US" dirty="0"/>
           </a:p>
@@ -2174,7 +2173,7 @@
     </p:spTree>
     <p:extLst>
       <p:ext uri="{BB962C8B-B14F-4D97-AF65-F5344CB8AC3E}">
-        <p14:creationId xmlns="" xmlns:p14="http://schemas.microsoft.com/office/powerpoint/2010/main" val="827629637"/>
+        <p14:creationId xmlns:p14="http://schemas.microsoft.com/office/powerpoint/2010/main" xmlns="" val="827629637"/>
       </p:ext>
     </p:extLst>
   </p:cSld>
@@ -2376,7 +2375,7 @@
             <a:fld id="{37724C19-980F-4321-AACF-69E1510F1043}" type="datetimeFigureOut">
               <a:rPr lang="en-US" smtClean="0"/>
               <a:pPr/>
-              <a:t>11/15/2016</a:t>
+              <a:t>11/21/2016</a:t>
             </a:fld>
             <a:endParaRPr lang="en-US" dirty="0"/>
           </a:p>
@@ -2428,7 +2427,7 @@
     </p:spTree>
     <p:extLst>
       <p:ext uri="{BB962C8B-B14F-4D97-AF65-F5344CB8AC3E}">
-        <p14:creationId xmlns="" xmlns:p14="http://schemas.microsoft.com/office/powerpoint/2010/main" val="3514816148"/>
+        <p14:creationId xmlns:p14="http://schemas.microsoft.com/office/powerpoint/2010/main" xmlns="" val="3514816148"/>
       </p:ext>
     </p:extLst>
   </p:cSld>
@@ -2589,7 +2588,7 @@
             <a:fld id="{37724C19-980F-4321-AACF-69E1510F1043}" type="datetimeFigureOut">
               <a:rPr lang="en-US" smtClean="0"/>
               <a:pPr/>
-              <a:t>11/15/2016</a:t>
+              <a:t>11/21/2016</a:t>
             </a:fld>
             <a:endParaRPr lang="en-US" dirty="0"/>
           </a:p>
@@ -2677,7 +2676,7 @@
     </p:spTree>
     <p:extLst>
       <p:ext uri="{BB962C8B-B14F-4D97-AF65-F5344CB8AC3E}">
-        <p14:creationId xmlns="" xmlns:p14="http://schemas.microsoft.com/office/powerpoint/2010/main" val="4213530645"/>
+        <p14:creationId xmlns:p14="http://schemas.microsoft.com/office/powerpoint/2010/main" xmlns="" val="4213530645"/>
       </p:ext>
     </p:extLst>
   </p:cSld>
@@ -3206,7 +3205,7 @@
             <a:avLst/>
           </a:prstGeom>
           <a:solidFill>
-            <a:srgbClr val="FF9797"/>
+            <a:srgbClr val="FB9E79"/>
           </a:solidFill>
           <a:ln w="19050">
             <a:solidFill>
@@ -3256,7 +3255,7 @@
             <a:avLst/>
           </a:prstGeom>
           <a:solidFill>
-            <a:srgbClr val="FDC199"/>
+            <a:srgbClr val="FBE29B"/>
           </a:solidFill>
           <a:ln w="19050">
             <a:solidFill>
@@ -3291,7 +3290,7 @@
       </p:sp>
       <p:sp>
         <p:nvSpPr>
-          <p:cNvPr id="19" name="Rectangle 36">
+          <p:cNvPr id="20" name="Rectangle 36">
             <a:hlinkClick r:id="rId3" action="ppaction://hlinksldjump"/>
           </p:cNvPr>
           <p:cNvSpPr/>
@@ -3299,14 +3298,14 @@
         </p:nvSpPr>
         <p:spPr>
           <a:xfrm>
-            <a:off x="4965031" y="4146885"/>
+            <a:off x="4965031" y="4154906"/>
             <a:ext cx="2310063" cy="561474"/>
           </a:xfrm>
           <a:prstGeom prst="rect">
             <a:avLst/>
           </a:prstGeom>
           <a:solidFill>
-            <a:srgbClr val="FBE29B"/>
+            <a:srgbClr val="C9F99D"/>
           </a:solidFill>
           <a:ln w="19050">
             <a:solidFill>
@@ -3339,56 +3338,6 @@
           </a:p>
         </p:txBody>
       </p:sp>
-      <p:sp>
-        <p:nvSpPr>
-          <p:cNvPr id="20" name="Rectangle 36">
-            <a:hlinkClick r:id="rId3" action="ppaction://hlinksldjump"/>
-          </p:cNvPr>
-          <p:cNvSpPr/>
-          <p:nvPr/>
-        </p:nvSpPr>
-        <p:spPr>
-          <a:xfrm>
-            <a:off x="4965031" y="4804611"/>
-            <a:ext cx="2310063" cy="561474"/>
-          </a:xfrm>
-          <a:prstGeom prst="rect">
-            <a:avLst/>
-          </a:prstGeom>
-          <a:solidFill>
-            <a:srgbClr val="C9F99D"/>
-          </a:solidFill>
-          <a:ln w="19050">
-            <a:solidFill>
-              <a:srgbClr val="D8D8D8"/>
-            </a:solidFill>
-          </a:ln>
-        </p:spPr>
-        <p:style>
-          <a:lnRef idx="2">
-            <a:schemeClr val="accent1">
-              <a:shade val="50000"/>
-            </a:schemeClr>
-          </a:lnRef>
-          <a:fillRef idx="1003">
-            <a:schemeClr val="lt1"/>
-          </a:fillRef>
-          <a:effectRef idx="0">
-            <a:schemeClr val="accent1"/>
-          </a:effectRef>
-          <a:fontRef idx="minor">
-            <a:schemeClr val="lt1"/>
-          </a:fontRef>
-        </p:style>
-        <p:txBody>
-          <a:bodyPr rtlCol="0" anchor="ctr"/>
-          <a:lstStyle/>
-          <a:p>
-            <a:pPr algn="ctr"/>
-            <a:endParaRPr lang="en-US" dirty="0"/>
-          </a:p>
-        </p:txBody>
-      </p:sp>
       <p:pic>
         <p:nvPicPr>
           <p:cNvPr id="21" name="20 Imagen" descr="StateBar.png"/>
@@ -3563,7 +3512,7 @@
         </p:nvSpPr>
         <p:spPr>
           <a:xfrm>
-            <a:off x="5470359" y="1692442"/>
+            <a:off x="5694949" y="1676400"/>
             <a:ext cx="393030" cy="264695"/>
           </a:xfrm>
           <a:prstGeom prst="roundRect">
@@ -3609,14 +3558,14 @@
       </p:sp>
       <p:sp>
         <p:nvSpPr>
-          <p:cNvPr id="29" name="28 Rectángulo redondeado"/>
-          <p:cNvSpPr/>
-          <p:nvPr/>
-        </p:nvSpPr>
-        <p:spPr>
-          <a:xfrm>
-            <a:off x="5895475" y="1700463"/>
-            <a:ext cx="393030" cy="264695"/>
+          <p:cNvPr id="30" name="29 Rectángulo redondeado"/>
+          <p:cNvSpPr/>
+          <p:nvPr/>
+        </p:nvSpPr>
+        <p:spPr>
+          <a:xfrm>
+            <a:off x="6208296" y="1700463"/>
+            <a:ext cx="409072" cy="264695"/>
           </a:xfrm>
           <a:prstGeom prst="roundRect">
             <a:avLst/>
@@ -3661,14 +3610,14 @@
       </p:sp>
       <p:sp>
         <p:nvSpPr>
-          <p:cNvPr id="30" name="29 Rectángulo redondeado"/>
-          <p:cNvSpPr/>
-          <p:nvPr/>
-        </p:nvSpPr>
-        <p:spPr>
-          <a:xfrm>
-            <a:off x="6328612" y="1700463"/>
-            <a:ext cx="409072" cy="264695"/>
+          <p:cNvPr id="32" name="31 Rectángulo redondeado"/>
+          <p:cNvSpPr/>
+          <p:nvPr/>
+        </p:nvSpPr>
+        <p:spPr>
+          <a:xfrm>
+            <a:off x="6785811" y="1676400"/>
+            <a:ext cx="368968" cy="264695"/>
           </a:xfrm>
           <a:prstGeom prst="roundRect">
             <a:avLst/>
@@ -3713,21 +3662,21 @@
       </p:sp>
       <p:sp>
         <p:nvSpPr>
-          <p:cNvPr id="32" name="31 Rectángulo redondeado"/>
-          <p:cNvSpPr/>
-          <p:nvPr/>
-        </p:nvSpPr>
-        <p:spPr>
-          <a:xfrm>
-            <a:off x="6785811" y="1676400"/>
-            <a:ext cx="368968" cy="264695"/>
+          <p:cNvPr id="33" name="32 Rectángulo redondeado"/>
+          <p:cNvSpPr/>
+          <p:nvPr/>
+        </p:nvSpPr>
+        <p:spPr>
+          <a:xfrm>
+            <a:off x="5117432" y="1692442"/>
+            <a:ext cx="401052" cy="264695"/>
           </a:xfrm>
           <a:prstGeom prst="roundRect">
             <a:avLst/>
           </a:prstGeom>
           <a:solidFill>
             <a:schemeClr val="bg2">
-              <a:alpha val="45000"/>
+              <a:alpha val="0"/>
             </a:schemeClr>
           </a:solidFill>
           <a:ln>
@@ -3765,58 +3714,6 @@
       </p:sp>
       <p:sp>
         <p:nvSpPr>
-          <p:cNvPr id="33" name="32 Rectángulo redondeado"/>
-          <p:cNvSpPr/>
-          <p:nvPr/>
-        </p:nvSpPr>
-        <p:spPr>
-          <a:xfrm>
-            <a:off x="5013159" y="1700463"/>
-            <a:ext cx="401052" cy="264695"/>
-          </a:xfrm>
-          <a:prstGeom prst="roundRect">
-            <a:avLst/>
-          </a:prstGeom>
-          <a:solidFill>
-            <a:schemeClr val="bg2">
-              <a:alpha val="0"/>
-            </a:schemeClr>
-          </a:solidFill>
-          <a:ln>
-            <a:solidFill>
-              <a:schemeClr val="bg2">
-                <a:alpha val="61000"/>
-              </a:schemeClr>
-            </a:solidFill>
-          </a:ln>
-        </p:spPr>
-        <p:style>
-          <a:lnRef idx="2">
-            <a:schemeClr val="accent1">
-              <a:shade val="50000"/>
-            </a:schemeClr>
-          </a:lnRef>
-          <a:fillRef idx="1">
-            <a:schemeClr val="accent1"/>
-          </a:fillRef>
-          <a:effectRef idx="0">
-            <a:schemeClr val="accent1"/>
-          </a:effectRef>
-          <a:fontRef idx="minor">
-            <a:schemeClr val="lt1"/>
-          </a:fontRef>
-        </p:style>
-        <p:txBody>
-          <a:bodyPr rtlCol="0" anchor="ctr"/>
-          <a:lstStyle/>
-          <a:p>
-            <a:pPr algn="ctr"/>
-            <a:endParaRPr lang="es-ES"/>
-          </a:p>
-        </p:txBody>
-      </p:sp>
-      <p:sp>
-        <p:nvSpPr>
           <p:cNvPr id="34" name="Rectangle 12">
             <a:hlinkClick r:id="rId5" action="ppaction://hlinksldjump"/>
           </p:cNvPr>
@@ -3868,53 +3765,6 @@
       </p:sp>
       <p:sp>
         <p:nvSpPr>
-          <p:cNvPr id="39" name="Rectangle 12">
-            <a:hlinkClick r:id="rId5" action="ppaction://hlinksldjump"/>
-          </p:cNvPr>
-          <p:cNvSpPr/>
-          <p:nvPr/>
-        </p:nvSpPr>
-        <p:spPr>
-          <a:xfrm>
-            <a:off x="5382126" y="4239719"/>
-            <a:ext cx="1477287" cy="370800"/>
-          </a:xfrm>
-          <a:prstGeom prst="rect">
-            <a:avLst/>
-          </a:prstGeom>
-          <a:noFill/>
-          <a:ln>
-            <a:noFill/>
-          </a:ln>
-        </p:spPr>
-        <p:style>
-          <a:lnRef idx="2">
-            <a:schemeClr val="dk1"/>
-          </a:lnRef>
-          <a:fillRef idx="1">
-            <a:schemeClr val="lt1"/>
-          </a:fillRef>
-          <a:effectRef idx="0">
-            <a:schemeClr val="dk1"/>
-          </a:effectRef>
-          <a:fontRef idx="minor">
-            <a:schemeClr val="dk1"/>
-          </a:fontRef>
-        </p:style>
-        <p:txBody>
-          <a:bodyPr rtlCol="0" anchor="ctr"/>
-          <a:lstStyle/>
-          <a:p>
-            <a:pPr algn="ctr"/>
-            <a:r>
-              <a:rPr lang="en-GB" sz="1100" dirty="0" smtClean="0"/>
-              <a:t>Disaster specific information</a:t>
-            </a:r>
-          </a:p>
-        </p:txBody>
-      </p:sp>
-      <p:sp>
-        <p:nvSpPr>
           <p:cNvPr id="40" name="Rectangle 12">
             <a:hlinkClick r:id="rId5" action="ppaction://hlinksldjump"/>
           </p:cNvPr>
@@ -3923,7 +3773,7 @@
         </p:nvSpPr>
         <p:spPr>
           <a:xfrm>
-            <a:off x="5358063" y="4913488"/>
+            <a:off x="5358063" y="4263783"/>
             <a:ext cx="1477287" cy="370800"/>
           </a:xfrm>
           <a:prstGeom prst="rect">
@@ -4038,14 +3888,13 @@
               <a:rPr lang="en-GB" sz="1100" dirty="0" smtClean="0"/>
               <a:t>First screen always quiz. To change, go to menu -&gt;</a:t>
             </a:r>
-            <a:endParaRPr lang="en-GB" sz="1100" dirty="0" smtClean="0"/>
           </a:p>
         </p:txBody>
       </p:sp>
     </p:spTree>
     <p:extLst>
       <p:ext uri="{BB962C8B-B14F-4D97-AF65-F5344CB8AC3E}">
-        <p14:creationId xmlns="" xmlns:p14="http://schemas.microsoft.com/office/powerpoint/2010/main" val="283767647"/>
+        <p14:creationId xmlns:p14="http://schemas.microsoft.com/office/powerpoint/2010/main" xmlns="" val="283767647"/>
       </p:ext>
     </p:extLst>
   </p:cSld>
@@ -4053,7 +3902,7 @@
     <a:masterClrMapping/>
   </p:clrMapOvr>
   <mc:AlternateContent xmlns:mc="http://schemas.openxmlformats.org/markup-compatibility/2006">
-    <mc:Choice xmlns="" xmlns:p14="http://schemas.microsoft.com/office/powerpoint/2010/main" Requires="p14">
+    <mc:Choice xmlns:p14="http://schemas.microsoft.com/office/powerpoint/2010/main" xmlns="" Requires="p14">
       <p:transition spd="slow" p14:dur="2000" advClick="0"/>
     </mc:Choice>
     <mc:Fallback>
@@ -4119,14 +3968,17 @@
         </p:nvSpPr>
         <p:spPr>
           <a:xfrm>
-            <a:off x="4827311" y="1507587"/>
+            <a:off x="4803248" y="1515608"/>
             <a:ext cx="2618278" cy="398254"/>
           </a:xfrm>
           <a:prstGeom prst="rect">
             <a:avLst/>
           </a:prstGeom>
           <a:solidFill>
-            <a:srgbClr val="FDC199"/>
+            <a:schemeClr val="accent4">
+              <a:lumMod val="40000"/>
+              <a:lumOff val="60000"/>
+            </a:schemeClr>
           </a:solidFill>
           <a:ln>
             <a:solidFill>
@@ -4206,8 +4058,8 @@
         </p:nvSpPr>
         <p:spPr>
           <a:xfrm>
-            <a:off x="5449821" y="1549335"/>
-            <a:ext cx="1432241" cy="370800"/>
+            <a:off x="5217211" y="1549335"/>
+            <a:ext cx="1809231" cy="370800"/>
           </a:xfrm>
           <a:prstGeom prst="rect">
             <a:avLst/>
@@ -4237,835 +4089,12 @@
           <a:p>
             <a:pPr algn="ctr"/>
             <a:r>
+              <a:rPr lang="en-GB" sz="1100" dirty="0" err="1" smtClean="0"/>
+              <a:t>Surrondings</a:t>
+            </a:r>
+            <a:r>
               <a:rPr lang="en-GB" sz="1100" dirty="0" smtClean="0"/>
-              <a:t>Surroundings state</a:t>
-            </a:r>
-            <a:endParaRPr lang="en-US" sz="1100" dirty="0"/>
-          </a:p>
-        </p:txBody>
-      </p:sp>
-      <p:sp>
-        <p:nvSpPr>
-          <p:cNvPr id="51" name="Rectangle 50"/>
-          <p:cNvSpPr/>
-          <p:nvPr/>
-        </p:nvSpPr>
-        <p:spPr>
-          <a:xfrm>
-            <a:off x="6515067" y="1803218"/>
-            <a:ext cx="1066800" cy="370800"/>
-          </a:xfrm>
-          <a:prstGeom prst="rect">
-            <a:avLst/>
-          </a:prstGeom>
-          <a:noFill/>
-          <a:ln>
-            <a:noFill/>
-          </a:ln>
-        </p:spPr>
-        <p:style>
-          <a:lnRef idx="2">
-            <a:schemeClr val="dk1"/>
-          </a:lnRef>
-          <a:fillRef idx="1">
-            <a:schemeClr val="lt1"/>
-          </a:fillRef>
-          <a:effectRef idx="0">
-            <a:schemeClr val="dk1"/>
-          </a:effectRef>
-          <a:fontRef idx="minor">
-            <a:schemeClr val="dk1"/>
-          </a:fontRef>
-        </p:style>
-        <p:txBody>
-          <a:bodyPr rtlCol="0" anchor="ctr"/>
-          <a:lstStyle/>
-          <a:p>
-            <a:pPr marL="171450" indent="-171450" algn="ctr">
-              <a:buFont typeface="Wingdings" panose="05000000000000000000" pitchFamily="2" charset="2"/>
-              <a:buChar char="ü"/>
-            </a:pPr>
-            <a:endParaRPr lang="en-US" sz="1100" dirty="0"/>
-          </a:p>
-        </p:txBody>
-      </p:sp>
-      <p:pic>
-        <p:nvPicPr>
-          <p:cNvPr id="62" name="Picture 61"/>
-          <p:cNvPicPr>
-            <a:picLocks noChangeAspect="1"/>
-          </p:cNvPicPr>
-          <p:nvPr/>
-        </p:nvPicPr>
-        <p:blipFill rotWithShape="1">
-          <a:blip r:embed="rId2" cstate="print"/>
-          <a:srcRect t="85496"/>
-          <a:stretch/>
-        </p:blipFill>
-        <p:spPr>
-          <a:xfrm>
-            <a:off x="4547970" y="5691187"/>
-            <a:ext cx="3096057" cy="924369"/>
-          </a:xfrm>
-          <a:prstGeom prst="rect">
-            <a:avLst/>
-          </a:prstGeom>
-        </p:spPr>
-      </p:pic>
-      <p:sp>
-        <p:nvSpPr>
-          <p:cNvPr id="65" name="Rectangle 64">
-            <a:hlinkClick r:id="rId3" action="ppaction://hlinksldjump"/>
-          </p:cNvPr>
-          <p:cNvSpPr/>
-          <p:nvPr/>
-        </p:nvSpPr>
-        <p:spPr>
-          <a:xfrm>
-            <a:off x="5822950" y="5842000"/>
-            <a:ext cx="539750" cy="567918"/>
-          </a:xfrm>
-          <a:prstGeom prst="rect">
-            <a:avLst/>
-          </a:prstGeom>
-          <a:solidFill>
-            <a:schemeClr val="bg1">
-              <a:alpha val="0"/>
-            </a:schemeClr>
-          </a:solidFill>
-          <a:ln>
-            <a:solidFill>
-              <a:schemeClr val="bg1">
-                <a:alpha val="0"/>
-              </a:schemeClr>
-            </a:solidFill>
-          </a:ln>
-        </p:spPr>
-        <p:style>
-          <a:lnRef idx="2">
-            <a:schemeClr val="accent1">
-              <a:shade val="50000"/>
-            </a:schemeClr>
-          </a:lnRef>
-          <a:fillRef idx="1">
-            <a:schemeClr val="accent1"/>
-          </a:fillRef>
-          <a:effectRef idx="0">
-            <a:schemeClr val="accent1"/>
-          </a:effectRef>
-          <a:fontRef idx="minor">
-            <a:schemeClr val="lt1"/>
-          </a:fontRef>
-        </p:style>
-        <p:txBody>
-          <a:bodyPr rtlCol="0" anchor="ctr"/>
-          <a:lstStyle/>
-          <a:p>
-            <a:pPr algn="ctr"/>
-            <a:endParaRPr lang="en-US" dirty="0"/>
-          </a:p>
-        </p:txBody>
-      </p:sp>
-      <p:sp>
-        <p:nvSpPr>
-          <p:cNvPr id="17" name="Rectangle 33"/>
-          <p:cNvSpPr/>
-          <p:nvPr/>
-        </p:nvSpPr>
-        <p:spPr>
-          <a:xfrm>
-            <a:off x="4819981" y="1913860"/>
-            <a:ext cx="2580280" cy="3774559"/>
-          </a:xfrm>
-          <a:prstGeom prst="rect">
-            <a:avLst/>
-          </a:prstGeom>
-          <a:solidFill>
-            <a:schemeClr val="bg1"/>
-          </a:solidFill>
-          <a:ln>
-            <a:solidFill>
-              <a:schemeClr val="tx1"/>
-            </a:solidFill>
-          </a:ln>
-        </p:spPr>
-        <p:style>
-          <a:lnRef idx="2">
-            <a:schemeClr val="accent1">
-              <a:shade val="50000"/>
-            </a:schemeClr>
-          </a:lnRef>
-          <a:fillRef idx="1">
-            <a:schemeClr val="accent1"/>
-          </a:fillRef>
-          <a:effectRef idx="0">
-            <a:schemeClr val="accent1"/>
-          </a:effectRef>
-          <a:fontRef idx="minor">
-            <a:schemeClr val="lt1"/>
-          </a:fontRef>
-        </p:style>
-        <p:txBody>
-          <a:bodyPr rtlCol="0" anchor="ctr"/>
-          <a:lstStyle/>
-          <a:p>
-            <a:pPr marL="171450" indent="-171450" algn="ctr">
-              <a:buFont typeface="Wingdings" panose="05000000000000000000" pitchFamily="2" charset="2"/>
-              <a:buChar char="ü"/>
-            </a:pPr>
-            <a:r>
-              <a:rPr lang="en-GB" dirty="0" smtClean="0"/>
-              <a:t> </a:t>
-            </a:r>
-            <a:endParaRPr lang="en-US" dirty="0"/>
-          </a:p>
-        </p:txBody>
-      </p:sp>
-      <p:sp>
-        <p:nvSpPr>
-          <p:cNvPr id="18" name="Rectangle 33"/>
-          <p:cNvSpPr/>
-          <p:nvPr/>
-        </p:nvSpPr>
-        <p:spPr>
-          <a:xfrm>
-            <a:off x="7070651" y="2083981"/>
-            <a:ext cx="159488" cy="148856"/>
-          </a:xfrm>
-          <a:prstGeom prst="rect">
-            <a:avLst/>
-          </a:prstGeom>
-          <a:solidFill>
-            <a:schemeClr val="bg1"/>
-          </a:solidFill>
-          <a:ln>
-            <a:solidFill>
-              <a:schemeClr val="tx1"/>
-            </a:solidFill>
-          </a:ln>
-        </p:spPr>
-        <p:style>
-          <a:lnRef idx="2">
-            <a:schemeClr val="accent1">
-              <a:shade val="50000"/>
-            </a:schemeClr>
-          </a:lnRef>
-          <a:fillRef idx="1">
-            <a:schemeClr val="accent1"/>
-          </a:fillRef>
-          <a:effectRef idx="0">
-            <a:schemeClr val="accent1"/>
-          </a:effectRef>
-          <a:fontRef idx="minor">
-            <a:schemeClr val="lt1"/>
-          </a:fontRef>
-        </p:style>
-        <p:txBody>
-          <a:bodyPr rtlCol="0" anchor="ctr"/>
-          <a:lstStyle/>
-          <a:p>
-            <a:pPr algn="ctr"/>
-            <a:endParaRPr lang="en-US" dirty="0">
-              <a:solidFill>
-                <a:schemeClr val="tx1"/>
-              </a:solidFill>
-            </a:endParaRPr>
-          </a:p>
-        </p:txBody>
-      </p:sp>
-      <p:sp>
-        <p:nvSpPr>
-          <p:cNvPr id="20" name="Rectangle 33"/>
-          <p:cNvSpPr/>
-          <p:nvPr/>
-        </p:nvSpPr>
-        <p:spPr>
-          <a:xfrm>
-            <a:off x="7074195" y="2395869"/>
-            <a:ext cx="159488" cy="148856"/>
-          </a:xfrm>
-          <a:prstGeom prst="rect">
-            <a:avLst/>
-          </a:prstGeom>
-          <a:solidFill>
-            <a:schemeClr val="bg1"/>
-          </a:solidFill>
-          <a:ln>
-            <a:solidFill>
-              <a:schemeClr val="tx1"/>
-            </a:solidFill>
-          </a:ln>
-        </p:spPr>
-        <p:style>
-          <a:lnRef idx="2">
-            <a:schemeClr val="accent1">
-              <a:shade val="50000"/>
-            </a:schemeClr>
-          </a:lnRef>
-          <a:fillRef idx="1">
-            <a:schemeClr val="accent1"/>
-          </a:fillRef>
-          <a:effectRef idx="0">
-            <a:schemeClr val="accent1"/>
-          </a:effectRef>
-          <a:fontRef idx="minor">
-            <a:schemeClr val="lt1"/>
-          </a:fontRef>
-        </p:style>
-        <p:txBody>
-          <a:bodyPr rtlCol="0" anchor="ctr"/>
-          <a:lstStyle/>
-          <a:p>
-            <a:pPr algn="ctr"/>
-            <a:endParaRPr lang="en-US" dirty="0">
-              <a:solidFill>
-                <a:schemeClr val="tx1"/>
-              </a:solidFill>
-            </a:endParaRPr>
-          </a:p>
-        </p:txBody>
-      </p:sp>
-      <p:sp>
-        <p:nvSpPr>
-          <p:cNvPr id="21" name="Rectangle 33"/>
-          <p:cNvSpPr/>
-          <p:nvPr/>
-        </p:nvSpPr>
-        <p:spPr>
-          <a:xfrm>
-            <a:off x="7074196" y="2682948"/>
-            <a:ext cx="159488" cy="148856"/>
-          </a:xfrm>
-          <a:prstGeom prst="rect">
-            <a:avLst/>
-          </a:prstGeom>
-          <a:solidFill>
-            <a:schemeClr val="bg1"/>
-          </a:solidFill>
-          <a:ln>
-            <a:solidFill>
-              <a:schemeClr val="tx1"/>
-            </a:solidFill>
-          </a:ln>
-        </p:spPr>
-        <p:style>
-          <a:lnRef idx="2">
-            <a:schemeClr val="accent1">
-              <a:shade val="50000"/>
-            </a:schemeClr>
-          </a:lnRef>
-          <a:fillRef idx="1">
-            <a:schemeClr val="accent1"/>
-          </a:fillRef>
-          <a:effectRef idx="0">
-            <a:schemeClr val="accent1"/>
-          </a:effectRef>
-          <a:fontRef idx="minor">
-            <a:schemeClr val="lt1"/>
-          </a:fontRef>
-        </p:style>
-        <p:txBody>
-          <a:bodyPr rtlCol="0" anchor="ctr"/>
-          <a:lstStyle/>
-          <a:p>
-            <a:pPr algn="ctr"/>
-            <a:endParaRPr lang="en-US" dirty="0">
-              <a:solidFill>
-                <a:schemeClr val="tx1"/>
-              </a:solidFill>
-            </a:endParaRPr>
-          </a:p>
-        </p:txBody>
-      </p:sp>
-      <p:sp>
-        <p:nvSpPr>
-          <p:cNvPr id="26" name="25 Rectángulo"/>
-          <p:cNvSpPr/>
-          <p:nvPr/>
-        </p:nvSpPr>
-        <p:spPr>
-          <a:xfrm>
-            <a:off x="7046284" y="2290872"/>
-            <a:ext cx="244549" cy="369332"/>
-          </a:xfrm>
-          <a:prstGeom prst="rect">
-            <a:avLst/>
-          </a:prstGeom>
-        </p:spPr>
-        <p:txBody>
-          <a:bodyPr wrap="square">
-            <a:spAutoFit/>
-          </a:bodyPr>
-          <a:lstStyle/>
-          <a:p>
-            <a:pPr marL="171450" indent="-171450" algn="ctr">
-              <a:buFont typeface="Wingdings" panose="05000000000000000000" pitchFamily="2" charset="2"/>
-              <a:buChar char="ü"/>
-            </a:pPr>
-            <a:r>
-              <a:rPr lang="en-GB" dirty="0" smtClean="0"/>
-              <a:t> </a:t>
-            </a:r>
-            <a:endParaRPr lang="en-US" dirty="0"/>
-          </a:p>
-        </p:txBody>
-      </p:sp>
-      <p:sp>
-        <p:nvSpPr>
-          <p:cNvPr id="81" name="Rectangle 27">
-            <a:hlinkClick r:id="rId3" action="ppaction://hlinksldjump"/>
-          </p:cNvPr>
-          <p:cNvSpPr/>
-          <p:nvPr/>
-        </p:nvSpPr>
-        <p:spPr>
-          <a:xfrm>
-            <a:off x="4820653" y="5382126"/>
-            <a:ext cx="2574758" cy="293610"/>
-          </a:xfrm>
-          <a:prstGeom prst="rect">
-            <a:avLst/>
-          </a:prstGeom>
-          <a:solidFill>
-            <a:srgbClr val="FDC199"/>
-          </a:solidFill>
-          <a:ln>
-            <a:solidFill>
-              <a:schemeClr val="tx1"/>
-            </a:solidFill>
-          </a:ln>
-        </p:spPr>
-        <p:style>
-          <a:lnRef idx="1">
-            <a:schemeClr val="accent6"/>
-          </a:lnRef>
-          <a:fillRef idx="2">
-            <a:schemeClr val="accent6"/>
-          </a:fillRef>
-          <a:effectRef idx="1">
-            <a:schemeClr val="accent6"/>
-          </a:effectRef>
-          <a:fontRef idx="minor">
-            <a:schemeClr val="dk1"/>
-          </a:fontRef>
-        </p:style>
-        <p:txBody>
-          <a:bodyPr rtlCol="0" anchor="ctr"/>
-          <a:lstStyle/>
-          <a:p>
-            <a:pPr algn="ctr"/>
-            <a:endParaRPr lang="en-US" dirty="0"/>
-          </a:p>
-        </p:txBody>
-      </p:sp>
-      <p:sp>
-        <p:nvSpPr>
-          <p:cNvPr id="67" name="Rectangle 12"/>
-          <p:cNvSpPr/>
-          <p:nvPr/>
-        </p:nvSpPr>
-        <p:spPr>
-          <a:xfrm>
-            <a:off x="5257317" y="5335272"/>
-            <a:ext cx="1664852" cy="370800"/>
-          </a:xfrm>
-          <a:prstGeom prst="rect">
-            <a:avLst/>
-          </a:prstGeom>
-          <a:noFill/>
-          <a:ln>
-            <a:noFill/>
-          </a:ln>
-        </p:spPr>
-        <p:style>
-          <a:lnRef idx="2">
-            <a:schemeClr val="dk1"/>
-          </a:lnRef>
-          <a:fillRef idx="1">
-            <a:schemeClr val="lt1"/>
-          </a:fillRef>
-          <a:effectRef idx="0">
-            <a:schemeClr val="dk1"/>
-          </a:effectRef>
-          <a:fontRef idx="minor">
-            <a:schemeClr val="dk1"/>
-          </a:fontRef>
-        </p:style>
-        <p:txBody>
-          <a:bodyPr rtlCol="0" anchor="ctr"/>
-          <a:lstStyle/>
-          <a:p>
-            <a:pPr algn="ctr"/>
-            <a:r>
-              <a:rPr lang="en-GB" sz="1100" dirty="0" smtClean="0"/>
-              <a:t>Send </a:t>
-            </a:r>
-            <a:endParaRPr lang="en-US" sz="1100" dirty="0"/>
-          </a:p>
-        </p:txBody>
-      </p:sp>
-      <p:sp>
-        <p:nvSpPr>
-          <p:cNvPr id="22" name="Rectangle 12"/>
-          <p:cNvSpPr/>
-          <p:nvPr/>
-        </p:nvSpPr>
-        <p:spPr>
-          <a:xfrm>
-            <a:off x="4757153" y="2008951"/>
-            <a:ext cx="1650441" cy="370800"/>
-          </a:xfrm>
-          <a:prstGeom prst="rect">
-            <a:avLst/>
-          </a:prstGeom>
-          <a:noFill/>
-          <a:ln>
-            <a:noFill/>
-          </a:ln>
-        </p:spPr>
-        <p:style>
-          <a:lnRef idx="2">
-            <a:schemeClr val="dk1"/>
-          </a:lnRef>
-          <a:fillRef idx="1">
-            <a:schemeClr val="lt1"/>
-          </a:fillRef>
-          <a:effectRef idx="0">
-            <a:schemeClr val="dk1"/>
-          </a:effectRef>
-          <a:fontRef idx="minor">
-            <a:schemeClr val="dk1"/>
-          </a:fontRef>
-        </p:style>
-        <p:txBody>
-          <a:bodyPr rtlCol="0" anchor="ctr"/>
-          <a:lstStyle/>
-          <a:p>
-            <a:pPr algn="ctr"/>
-            <a:r>
-              <a:rPr lang="es-ES" sz="1100" dirty="0" err="1" smtClean="0"/>
-              <a:t>Add</a:t>
-            </a:r>
-            <a:r>
-              <a:rPr lang="es-ES" sz="1100" dirty="0" smtClean="0"/>
-              <a:t> </a:t>
-            </a:r>
-            <a:r>
-              <a:rPr lang="es-ES" sz="1100" dirty="0" err="1" smtClean="0"/>
-              <a:t>question</a:t>
-            </a:r>
-            <a:endParaRPr lang="en-US" sz="1100" dirty="0"/>
-          </a:p>
-        </p:txBody>
-      </p:sp>
-      <p:sp>
-        <p:nvSpPr>
-          <p:cNvPr id="23" name="Rectangle 12"/>
-          <p:cNvSpPr/>
-          <p:nvPr/>
-        </p:nvSpPr>
-        <p:spPr>
-          <a:xfrm>
-            <a:off x="4755398" y="2280329"/>
-            <a:ext cx="1658102" cy="370800"/>
-          </a:xfrm>
-          <a:prstGeom prst="rect">
-            <a:avLst/>
-          </a:prstGeom>
-          <a:noFill/>
-          <a:ln>
-            <a:noFill/>
-          </a:ln>
-        </p:spPr>
-        <p:style>
-          <a:lnRef idx="2">
-            <a:schemeClr val="dk1"/>
-          </a:lnRef>
-          <a:fillRef idx="1">
-            <a:schemeClr val="lt1"/>
-          </a:fillRef>
-          <a:effectRef idx="0">
-            <a:schemeClr val="dk1"/>
-          </a:effectRef>
-          <a:fontRef idx="minor">
-            <a:schemeClr val="dk1"/>
-          </a:fontRef>
-        </p:style>
-        <p:txBody>
-          <a:bodyPr rtlCol="0" anchor="ctr"/>
-          <a:lstStyle/>
-          <a:p>
-            <a:pPr algn="ctr"/>
-            <a:r>
-              <a:rPr lang="es-ES" sz="1100" dirty="0" err="1" smtClean="0"/>
-              <a:t>Add</a:t>
-            </a:r>
-            <a:r>
-              <a:rPr lang="es-ES" sz="1100" dirty="0" smtClean="0"/>
-              <a:t> </a:t>
-            </a:r>
-            <a:r>
-              <a:rPr lang="es-ES" sz="1100" dirty="0" err="1" smtClean="0"/>
-              <a:t>question</a:t>
-            </a:r>
-            <a:endParaRPr lang="en-US" sz="1100" dirty="0"/>
-          </a:p>
-        </p:txBody>
-      </p:sp>
-      <p:sp>
-        <p:nvSpPr>
-          <p:cNvPr id="24" name="Rectangle 12"/>
-          <p:cNvSpPr/>
-          <p:nvPr/>
-        </p:nvSpPr>
-        <p:spPr>
-          <a:xfrm>
-            <a:off x="4625323" y="2566079"/>
-            <a:ext cx="1948597" cy="370800"/>
-          </a:xfrm>
-          <a:prstGeom prst="rect">
-            <a:avLst/>
-          </a:prstGeom>
-          <a:noFill/>
-          <a:ln>
-            <a:noFill/>
-          </a:ln>
-        </p:spPr>
-        <p:style>
-          <a:lnRef idx="2">
-            <a:schemeClr val="dk1"/>
-          </a:lnRef>
-          <a:fillRef idx="1">
-            <a:schemeClr val="lt1"/>
-          </a:fillRef>
-          <a:effectRef idx="0">
-            <a:schemeClr val="dk1"/>
-          </a:effectRef>
-          <a:fontRef idx="minor">
-            <a:schemeClr val="dk1"/>
-          </a:fontRef>
-        </p:style>
-        <p:txBody>
-          <a:bodyPr rtlCol="0" anchor="ctr"/>
-          <a:lstStyle/>
-          <a:p>
-            <a:pPr algn="ctr"/>
-            <a:r>
-              <a:rPr lang="es-ES" sz="1100" dirty="0" err="1" smtClean="0"/>
-              <a:t>Add</a:t>
-            </a:r>
-            <a:r>
-              <a:rPr lang="es-ES" sz="1100" dirty="0" smtClean="0"/>
-              <a:t> </a:t>
-            </a:r>
-            <a:r>
-              <a:rPr lang="es-ES" sz="1100" dirty="0" err="1" smtClean="0"/>
-              <a:t>question</a:t>
-            </a:r>
-            <a:endParaRPr lang="en-US" sz="1100" dirty="0"/>
-          </a:p>
-        </p:txBody>
-      </p:sp>
-    </p:spTree>
-    <p:extLst>
-      <p:ext uri="{BB962C8B-B14F-4D97-AF65-F5344CB8AC3E}">
-        <p14:creationId xmlns="" xmlns:p14="http://schemas.microsoft.com/office/powerpoint/2010/main" val="283767647"/>
-      </p:ext>
-    </p:extLst>
-  </p:cSld>
-  <p:clrMapOvr>
-    <a:masterClrMapping/>
-  </p:clrMapOvr>
-  <mc:AlternateContent xmlns:mc="http://schemas.openxmlformats.org/markup-compatibility/2006">
-    <mc:Choice xmlns="" xmlns:p14="http://schemas.microsoft.com/office/powerpoint/2010/main" Requires="p14">
-      <p:transition spd="slow" p14:dur="2000" advClick="0"/>
-    </mc:Choice>
-    <mc:Fallback>
-      <p:transition spd="slow" advClick="0"/>
-    </mc:Fallback>
-  </mc:AlternateContent>
-  <p:timing>
-    <p:tnLst>
-      <p:par>
-        <p:cTn id="1" dur="indefinite" restart="never" nodeType="tmRoot"/>
-      </p:par>
-    </p:tnLst>
-  </p:timing>
-</p:sld>
-</file>
-
-<file path=ppt/slides/slide11.xml><?xml version="1.0" encoding="utf-8"?>
-<p:sld xmlns:a="http://schemas.openxmlformats.org/drawingml/2006/main" xmlns:r="http://schemas.openxmlformats.org/officeDocument/2006/relationships" xmlns:p="http://schemas.openxmlformats.org/presentationml/2006/main">
-  <p:cSld>
-    <p:spTree>
-      <p:nvGrpSpPr>
-        <p:cNvPr id="1" name=""/>
-        <p:cNvGrpSpPr/>
-        <p:nvPr/>
-      </p:nvGrpSpPr>
-      <p:grpSpPr>
-        <a:xfrm>
-          <a:off x="0" y="0"/>
-          <a:ext cx="0" cy="0"/>
-          <a:chOff x="0" y="0"/>
-          <a:chExt cx="0" cy="0"/>
-        </a:xfrm>
-      </p:grpSpPr>
-      <p:pic>
-        <p:nvPicPr>
-          <p:cNvPr id="6" name="Picture 5"/>
-          <p:cNvPicPr>
-            <a:picLocks noChangeAspect="1"/>
-          </p:cNvPicPr>
-          <p:nvPr/>
-        </p:nvPicPr>
-        <p:blipFill>
-          <a:blip r:embed="rId2" cstate="print"/>
-          <a:stretch>
-            <a:fillRect/>
-          </a:stretch>
-        </p:blipFill>
-        <p:spPr>
-          <a:xfrm>
-            <a:off x="4547971" y="242443"/>
-            <a:ext cx="3096057" cy="6373114"/>
-          </a:xfrm>
-          <a:prstGeom prst="rect">
-            <a:avLst/>
-          </a:prstGeom>
-        </p:spPr>
-      </p:pic>
-      <p:sp>
-        <p:nvSpPr>
-          <p:cNvPr id="28" name="Rectangle 27"/>
-          <p:cNvSpPr/>
-          <p:nvPr/>
-        </p:nvSpPr>
-        <p:spPr>
-          <a:xfrm>
-            <a:off x="4803248" y="1515608"/>
-            <a:ext cx="2618278" cy="398254"/>
-          </a:xfrm>
-          <a:prstGeom prst="rect">
-            <a:avLst/>
-          </a:prstGeom>
-          <a:solidFill>
-            <a:schemeClr val="accent4">
-              <a:lumMod val="40000"/>
-              <a:lumOff val="60000"/>
-            </a:schemeClr>
-          </a:solidFill>
-          <a:ln>
-            <a:solidFill>
-              <a:schemeClr val="tx1"/>
-            </a:solidFill>
-          </a:ln>
-        </p:spPr>
-        <p:style>
-          <a:lnRef idx="1">
-            <a:schemeClr val="accent6"/>
-          </a:lnRef>
-          <a:fillRef idx="2">
-            <a:schemeClr val="accent6"/>
-          </a:fillRef>
-          <a:effectRef idx="1">
-            <a:schemeClr val="accent6"/>
-          </a:effectRef>
-          <a:fontRef idx="minor">
-            <a:schemeClr val="dk1"/>
-          </a:fontRef>
-        </p:style>
-        <p:txBody>
-          <a:bodyPr rtlCol="0" anchor="ctr"/>
-          <a:lstStyle/>
-          <a:p>
-            <a:pPr algn="ctr"/>
-            <a:endParaRPr lang="en-US" dirty="0"/>
-          </a:p>
-        </p:txBody>
-      </p:sp>
-      <p:sp>
-        <p:nvSpPr>
-          <p:cNvPr id="48" name="TextBox 47"/>
-          <p:cNvSpPr txBox="1"/>
-          <p:nvPr/>
-        </p:nvSpPr>
-        <p:spPr>
-          <a:xfrm>
-            <a:off x="4813300" y="1175561"/>
-            <a:ext cx="2628900" cy="369332"/>
-          </a:xfrm>
-          <a:prstGeom prst="rect">
-            <a:avLst/>
-          </a:prstGeom>
-          <a:solidFill>
-            <a:schemeClr val="accent2"/>
-          </a:solidFill>
-        </p:spPr>
-        <p:txBody>
-          <a:bodyPr wrap="square" rtlCol="0">
-            <a:spAutoFit/>
-          </a:bodyPr>
-          <a:lstStyle/>
-          <a:p>
-            <a:pPr algn="ctr"/>
-            <a:r>
-              <a:rPr lang="en-GB" dirty="0" smtClean="0">
-                <a:solidFill>
-                  <a:schemeClr val="bg1"/>
-                </a:solidFill>
-              </a:rPr>
-              <a:t>Survive</a:t>
-            </a:r>
-            <a:endParaRPr lang="en-US" dirty="0">
-              <a:solidFill>
-                <a:schemeClr val="bg1"/>
-              </a:solidFill>
-            </a:endParaRPr>
-          </a:p>
-        </p:txBody>
-      </p:sp>
-      <p:sp>
-        <p:nvSpPr>
-          <p:cNvPr id="13" name="Rectangle 12"/>
-          <p:cNvSpPr/>
-          <p:nvPr/>
-        </p:nvSpPr>
-        <p:spPr>
-          <a:xfrm>
-            <a:off x="5217211" y="1549335"/>
-            <a:ext cx="1809231" cy="370800"/>
-          </a:xfrm>
-          <a:prstGeom prst="rect">
-            <a:avLst/>
-          </a:prstGeom>
-          <a:noFill/>
-          <a:ln>
-            <a:noFill/>
-          </a:ln>
-        </p:spPr>
-        <p:style>
-          <a:lnRef idx="2">
-            <a:schemeClr val="dk1"/>
-          </a:lnRef>
-          <a:fillRef idx="1">
-            <a:schemeClr val="lt1"/>
-          </a:fillRef>
-          <a:effectRef idx="0">
-            <a:schemeClr val="dk1"/>
-          </a:effectRef>
-          <a:fontRef idx="minor">
-            <a:schemeClr val="dk1"/>
-          </a:fontRef>
-        </p:style>
-        <p:txBody>
-          <a:bodyPr rtlCol="0" anchor="ctr"/>
-          <a:lstStyle/>
-          <a:p>
-            <a:pPr algn="ctr"/>
-            <a:r>
-              <a:rPr lang="en-GB" sz="1100" dirty="0" smtClean="0"/>
-              <a:t>Disaster Specific Information</a:t>
+              <a:t> state</a:t>
             </a:r>
             <a:endParaRPr lang="en-US" sz="1100" dirty="0"/>
           </a:p>
@@ -6586,7 +5615,7 @@
     </p:spTree>
     <p:extLst>
       <p:ext uri="{BB962C8B-B14F-4D97-AF65-F5344CB8AC3E}">
-        <p14:creationId xmlns="" xmlns:p14="http://schemas.microsoft.com/office/powerpoint/2010/main" val="283767647"/>
+        <p14:creationId xmlns:p14="http://schemas.microsoft.com/office/powerpoint/2010/main" xmlns="" val="283767647"/>
       </p:ext>
     </p:extLst>
   </p:cSld>
@@ -6594,7 +5623,7 @@
     <a:masterClrMapping/>
   </p:clrMapOvr>
   <mc:AlternateContent xmlns:mc="http://schemas.openxmlformats.org/markup-compatibility/2006">
-    <mc:Choice xmlns="" xmlns:p14="http://schemas.microsoft.com/office/powerpoint/2010/main" Requires="p14">
+    <mc:Choice xmlns:p14="http://schemas.microsoft.com/office/powerpoint/2010/main" xmlns="" Requires="p14">
       <p:transition spd="slow" p14:dur="2000" advClick="0"/>
     </mc:Choice>
     <mc:Fallback>
@@ -6611,7 +5640,7 @@
 </p:sld>
 </file>
 
-<file path=ppt/slides/slide12.xml><?xml version="1.0" encoding="utf-8"?>
+<file path=ppt/slides/slide11.xml><?xml version="1.0" encoding="utf-8"?>
 <p:sld xmlns:a="http://schemas.openxmlformats.org/drawingml/2006/main" xmlns:r="http://schemas.openxmlformats.org/officeDocument/2006/relationships" xmlns:p="http://schemas.openxmlformats.org/presentationml/2006/main">
   <p:cSld>
     <p:spTree>
@@ -8730,7 +7759,7 @@
     </p:spTree>
     <p:extLst>
       <p:ext uri="{BB962C8B-B14F-4D97-AF65-F5344CB8AC3E}">
-        <p14:creationId xmlns="" xmlns:p14="http://schemas.microsoft.com/office/powerpoint/2010/main" val="283767647"/>
+        <p14:creationId xmlns:p14="http://schemas.microsoft.com/office/powerpoint/2010/main" xmlns="" val="283767647"/>
       </p:ext>
     </p:extLst>
   </p:cSld>
@@ -8738,7 +7767,7 @@
     <a:masterClrMapping/>
   </p:clrMapOvr>
   <mc:AlternateContent xmlns:mc="http://schemas.openxmlformats.org/markup-compatibility/2006">
-    <mc:Choice xmlns="" xmlns:p14="http://schemas.microsoft.com/office/powerpoint/2010/main" Requires="p14">
+    <mc:Choice xmlns:p14="http://schemas.microsoft.com/office/powerpoint/2010/main" xmlns="" Requires="p14">
       <p:transition spd="slow" p14:dur="2000" advClick="0"/>
     </mc:Choice>
     <mc:Fallback>
@@ -10025,11 +9054,6 @@
               </a:rPr>
               <a:t>Answer quiz</a:t>
             </a:r>
-            <a:endParaRPr lang="en-GB" sz="1100" dirty="0" smtClean="0">
-              <a:solidFill>
-                <a:schemeClr val="bg1"/>
-              </a:solidFill>
-            </a:endParaRPr>
           </a:p>
         </p:txBody>
       </p:sp>
@@ -10138,7 +9162,7 @@
     </p:spTree>
     <p:extLst>
       <p:ext uri="{BB962C8B-B14F-4D97-AF65-F5344CB8AC3E}">
-        <p14:creationId xmlns="" xmlns:p14="http://schemas.microsoft.com/office/powerpoint/2010/main" val="283767647"/>
+        <p14:creationId xmlns:p14="http://schemas.microsoft.com/office/powerpoint/2010/main" xmlns="" val="283767647"/>
       </p:ext>
     </p:extLst>
   </p:cSld>
@@ -10146,7 +9170,7 @@
     <a:masterClrMapping/>
   </p:clrMapOvr>
   <mc:AlternateContent xmlns:mc="http://schemas.openxmlformats.org/markup-compatibility/2006">
-    <mc:Choice xmlns="" xmlns:p14="http://schemas.microsoft.com/office/powerpoint/2010/main" Requires="p14">
+    <mc:Choice xmlns:p14="http://schemas.microsoft.com/office/powerpoint/2010/main" xmlns="" Requires="p14">
       <p:transition spd="slow" p14:dur="2000" advClick="0"/>
     </mc:Choice>
     <mc:Fallback>
@@ -10704,11 +9728,7 @@
           <a:p>
             <a:r>
               <a:rPr lang="en-GB" sz="1200" dirty="0" smtClean="0"/>
-              <a:t>M</a:t>
-            </a:r>
-            <a:r>
-              <a:rPr lang="en-GB" sz="1200" dirty="0" smtClean="0"/>
-              <a:t>edicines</a:t>
+              <a:t>Medicines</a:t>
             </a:r>
             <a:endParaRPr lang="es-ES" sz="1200" dirty="0"/>
           </a:p>
@@ -11040,14 +10060,13 @@
               <a:rPr lang="en-GB" sz="1100" dirty="0" smtClean="0"/>
               <a:t>Swarm Pulse maps -&gt;</a:t>
             </a:r>
-            <a:endParaRPr lang="en-GB" sz="1100" dirty="0" smtClean="0"/>
           </a:p>
         </p:txBody>
       </p:sp>
     </p:spTree>
     <p:extLst>
       <p:ext uri="{BB962C8B-B14F-4D97-AF65-F5344CB8AC3E}">
-        <p14:creationId xmlns="" xmlns:p14="http://schemas.microsoft.com/office/powerpoint/2010/main" val="283767647"/>
+        <p14:creationId xmlns:p14="http://schemas.microsoft.com/office/powerpoint/2010/main" xmlns="" val="283767647"/>
       </p:ext>
     </p:extLst>
   </p:cSld>
@@ -11055,7 +10074,7 @@
     <a:masterClrMapping/>
   </p:clrMapOvr>
   <mc:AlternateContent xmlns:mc="http://schemas.openxmlformats.org/markup-compatibility/2006">
-    <mc:Choice xmlns="" xmlns:p14="http://schemas.microsoft.com/office/powerpoint/2010/main" Requires="p14">
+    <mc:Choice xmlns:p14="http://schemas.microsoft.com/office/powerpoint/2010/main" xmlns="" Requires="p14">
       <p:transition spd="slow" p14:dur="2000" advClick="0"/>
     </mc:Choice>
     <mc:Fallback>
@@ -11732,7 +10751,6 @@
               <a:rPr lang="en-GB" sz="1100" dirty="0" smtClean="0"/>
               <a:t>Tornado</a:t>
             </a:r>
-            <a:endParaRPr lang="en-GB" sz="1100" dirty="0" smtClean="0"/>
           </a:p>
         </p:txBody>
       </p:sp>
@@ -11856,7 +10874,7 @@
     </p:spTree>
     <p:extLst>
       <p:ext uri="{BB962C8B-B14F-4D97-AF65-F5344CB8AC3E}">
-        <p14:creationId xmlns="" xmlns:p14="http://schemas.microsoft.com/office/powerpoint/2010/main" val="283767647"/>
+        <p14:creationId xmlns:p14="http://schemas.microsoft.com/office/powerpoint/2010/main" xmlns="" val="283767647"/>
       </p:ext>
     </p:extLst>
   </p:cSld>
@@ -11864,7 +10882,7 @@
     <a:masterClrMapping/>
   </p:clrMapOvr>
   <mc:AlternateContent xmlns:mc="http://schemas.openxmlformats.org/markup-compatibility/2006">
-    <mc:Choice xmlns="" xmlns:p14="http://schemas.microsoft.com/office/powerpoint/2010/main" Requires="p14">
+    <mc:Choice xmlns:p14="http://schemas.microsoft.com/office/powerpoint/2010/main" xmlns="" Requires="p14">
       <p:transition spd="slow" p14:dur="2000" advClick="0"/>
     </mc:Choice>
     <mc:Fallback>
@@ -12341,7 +11359,6 @@
               <a:rPr lang="en-GB" sz="1100" dirty="0" smtClean="0"/>
               <a:t>Shows useful information regarding this type of natural disaster -&gt;</a:t>
             </a:r>
-            <a:endParaRPr lang="en-GB" sz="1100" dirty="0" smtClean="0"/>
           </a:p>
         </p:txBody>
       </p:sp>
@@ -12623,7 +11640,7 @@
     </p:spTree>
     <p:extLst>
       <p:ext uri="{BB962C8B-B14F-4D97-AF65-F5344CB8AC3E}">
-        <p14:creationId xmlns="" xmlns:p14="http://schemas.microsoft.com/office/powerpoint/2010/main" val="283767647"/>
+        <p14:creationId xmlns:p14="http://schemas.microsoft.com/office/powerpoint/2010/main" xmlns="" val="283767647"/>
       </p:ext>
     </p:extLst>
   </p:cSld>
@@ -12631,7 +11648,7 @@
     <a:masterClrMapping/>
   </p:clrMapOvr>
   <mc:AlternateContent xmlns:mc="http://schemas.openxmlformats.org/markup-compatibility/2006">
-    <mc:Choice xmlns="" xmlns:p14="http://schemas.microsoft.com/office/powerpoint/2010/main" Requires="p14">
+    <mc:Choice xmlns:p14="http://schemas.microsoft.com/office/powerpoint/2010/main" xmlns="" Requires="p14">
       <p:transition spd="slow" p14:dur="2000" advClick="0"/>
     </mc:Choice>
     <mc:Fallback>
@@ -13547,14 +12564,13 @@
               <a:rPr lang="en-GB" sz="1100" dirty="0" smtClean="0"/>
               <a:t>Shows useful information regarding this type of natural disaster -&gt;</a:t>
             </a:r>
-            <a:endParaRPr lang="en-GB" sz="1100" dirty="0" smtClean="0"/>
           </a:p>
         </p:txBody>
       </p:sp>
     </p:spTree>
     <p:extLst>
       <p:ext uri="{BB962C8B-B14F-4D97-AF65-F5344CB8AC3E}">
-        <p14:creationId xmlns="" xmlns:p14="http://schemas.microsoft.com/office/powerpoint/2010/main" val="283767647"/>
+        <p14:creationId xmlns:p14="http://schemas.microsoft.com/office/powerpoint/2010/main" xmlns="" val="283767647"/>
       </p:ext>
     </p:extLst>
   </p:cSld>
@@ -13562,7 +12578,7 @@
     <a:masterClrMapping/>
   </p:clrMapOvr>
   <mc:AlternateContent xmlns:mc="http://schemas.openxmlformats.org/markup-compatibility/2006">
-    <mc:Choice xmlns="" xmlns:p14="http://schemas.microsoft.com/office/powerpoint/2010/main" Requires="p14">
+    <mc:Choice xmlns:p14="http://schemas.microsoft.com/office/powerpoint/2010/main" xmlns="" Requires="p14">
       <p:transition spd="slow" p14:dur="2000" advClick="0"/>
     </mc:Choice>
     <mc:Fallback>
@@ -14484,14 +13500,13 @@
               <a:rPr lang="en-GB" sz="1100" dirty="0" smtClean="0"/>
               <a:t>Shows useful information regarding this type of natural disaster -&gt;</a:t>
             </a:r>
-            <a:endParaRPr lang="en-GB" sz="1100" dirty="0" smtClean="0"/>
           </a:p>
         </p:txBody>
       </p:sp>
     </p:spTree>
     <p:extLst>
       <p:ext uri="{BB962C8B-B14F-4D97-AF65-F5344CB8AC3E}">
-        <p14:creationId xmlns="" xmlns:p14="http://schemas.microsoft.com/office/powerpoint/2010/main" val="283767647"/>
+        <p14:creationId xmlns:p14="http://schemas.microsoft.com/office/powerpoint/2010/main" xmlns="" val="283767647"/>
       </p:ext>
     </p:extLst>
   </p:cSld>
@@ -14499,7 +13514,7 @@
     <a:masterClrMapping/>
   </p:clrMapOvr>
   <mc:AlternateContent xmlns:mc="http://schemas.openxmlformats.org/markup-compatibility/2006">
-    <mc:Choice xmlns="" xmlns:p14="http://schemas.microsoft.com/office/powerpoint/2010/main" Requires="p14">
+    <mc:Choice xmlns:p14="http://schemas.microsoft.com/office/powerpoint/2010/main" xmlns="" Requires="p14">
       <p:transition spd="slow" p14:dur="2000" advClick="0"/>
     </mc:Choice>
     <mc:Fallback>
@@ -15315,7 +14330,7 @@
     </p:spTree>
     <p:extLst>
       <p:ext uri="{BB962C8B-B14F-4D97-AF65-F5344CB8AC3E}">
-        <p14:creationId xmlns="" xmlns:p14="http://schemas.microsoft.com/office/powerpoint/2010/main" val="283767647"/>
+        <p14:creationId xmlns:p14="http://schemas.microsoft.com/office/powerpoint/2010/main" xmlns="" val="283767647"/>
       </p:ext>
     </p:extLst>
   </p:cSld>
@@ -15323,7 +14338,7 @@
     <a:masterClrMapping/>
   </p:clrMapOvr>
   <mc:AlternateContent xmlns:mc="http://schemas.openxmlformats.org/markup-compatibility/2006">
-    <mc:Choice xmlns="" xmlns:p14="http://schemas.microsoft.com/office/powerpoint/2010/main" Requires="p14">
+    <mc:Choice xmlns:p14="http://schemas.microsoft.com/office/powerpoint/2010/main" xmlns="" Requires="p14">
       <p:transition spd="slow" p14:dur="2000" advClick="0"/>
     </mc:Choice>
     <mc:Fallback>
@@ -15396,7 +14411,7 @@
             <a:avLst/>
           </a:prstGeom>
           <a:solidFill>
-            <a:srgbClr val="FF9797"/>
+            <a:srgbClr val="FDC199"/>
           </a:solidFill>
           <a:ln>
             <a:solidFill>
@@ -15897,7 +14912,7 @@
             <a:avLst/>
           </a:prstGeom>
           <a:solidFill>
-            <a:srgbClr val="FF9797"/>
+            <a:srgbClr val="FDC199"/>
           </a:solidFill>
           <a:ln>
             <a:solidFill>
@@ -16139,7 +15154,7 @@
     </p:spTree>
     <p:extLst>
       <p:ext uri="{BB962C8B-B14F-4D97-AF65-F5344CB8AC3E}">
-        <p14:creationId xmlns="" xmlns:p14="http://schemas.microsoft.com/office/powerpoint/2010/main" val="283767647"/>
+        <p14:creationId xmlns:p14="http://schemas.microsoft.com/office/powerpoint/2010/main" xmlns="" val="283767647"/>
       </p:ext>
     </p:extLst>
   </p:cSld>
@@ -16147,7 +15162,7 @@
     <a:masterClrMapping/>
   </p:clrMapOvr>
   <mc:AlternateContent xmlns:mc="http://schemas.openxmlformats.org/markup-compatibility/2006">
-    <mc:Choice xmlns="" xmlns:p14="http://schemas.microsoft.com/office/powerpoint/2010/main" Requires="p14">
+    <mc:Choice xmlns:p14="http://schemas.microsoft.com/office/powerpoint/2010/main" xmlns="" Requires="p14">
       <p:transition spd="slow" p14:dur="2000" advClick="0"/>
     </mc:Choice>
     <mc:Fallback>
@@ -16453,7 +15468,7 @@
   <a:extraClrSchemeLst/>
   <a:extLst>
     <a:ext uri="{05A4C25C-085E-4340-85A3-A5531E510DB2}">
-      <thm15:themeFamily xmlns="" xmlns:thm15="http://schemas.microsoft.com/office/thememl/2012/main" name="Office Theme" id="{62F939B6-93AF-4DB8-9C6B-D6C7DFDC589F}" vid="{4A3C46E8-61CC-4603-A589-7422A47A8E4A}"/>
+      <thm15:themeFamily xmlns:thm15="http://schemas.microsoft.com/office/thememl/2012/main" xmlns="" name="Office Theme" id="{62F939B6-93AF-4DB8-9C6B-D6C7DFDC589F}" vid="{4A3C46E8-61CC-4603-A589-7422A47A8E4A}"/>
     </a:ext>
   </a:extLst>
 </a:theme>

</xml_diff>

<commit_message>
survival v3 styles, colours...
</commit_message>
<xml_diff>
--- a/Docs/Survive Axon Demo v2.pptx
+++ b/Docs/Survive Axon Demo v2.pptx
@@ -116,7 +116,7 @@
   </p:defaultTextStyle>
   <p:extLst>
     <p:ext uri="{EFAFB233-063F-42B5-8137-9DF3F51BA10A}">
-      <p15:sldGuideLst xmlns:p15="http://schemas.microsoft.com/office/powerpoint/2012/main" xmlns=""/>
+      <p15:sldGuideLst xmlns="" xmlns:p15="http://schemas.microsoft.com/office/powerpoint/2012/main"/>
     </p:ext>
   </p:extLst>
 </p:presentation>
@@ -127,7 +127,7 @@
   <p:cmAuthor id="1" name="Patrick M" initials="PM" lastIdx="1" clrIdx="0">
     <p:extLst>
       <p:ext uri="{19B8F6BF-5375-455C-9EA6-DF929625EA0E}">
-        <p15:presenceInfo xmlns:p15="http://schemas.microsoft.com/office/powerpoint/2012/main" xmlns="" userId="293365ab57c4ddb0" providerId="Windows Live"/>
+        <p15:presenceInfo xmlns="" xmlns:p15="http://schemas.microsoft.com/office/powerpoint/2012/main" userId="293365ab57c4ddb0" providerId="Windows Live"/>
       </p:ext>
     </p:extLst>
   </p:cmAuthor>
@@ -264,7 +264,7 @@
             <a:fld id="{37724C19-980F-4321-AACF-69E1510F1043}" type="datetimeFigureOut">
               <a:rPr lang="en-US" smtClean="0"/>
               <a:pPr/>
-              <a:t>11/21/2016</a:t>
+              <a:t>12/14/2016</a:t>
             </a:fld>
             <a:endParaRPr lang="en-US" dirty="0"/>
           </a:p>
@@ -316,7 +316,7 @@
     </p:spTree>
     <p:extLst>
       <p:ext uri="{BB962C8B-B14F-4D97-AF65-F5344CB8AC3E}">
-        <p14:creationId xmlns:p14="http://schemas.microsoft.com/office/powerpoint/2010/main" xmlns="" val="4276609490"/>
+        <p14:creationId xmlns="" xmlns:p14="http://schemas.microsoft.com/office/powerpoint/2010/main" val="4276609490"/>
       </p:ext>
     </p:extLst>
   </p:cSld>
@@ -434,7 +434,7 @@
             <a:fld id="{37724C19-980F-4321-AACF-69E1510F1043}" type="datetimeFigureOut">
               <a:rPr lang="en-US" smtClean="0"/>
               <a:pPr/>
-              <a:t>11/21/2016</a:t>
+              <a:t>12/14/2016</a:t>
             </a:fld>
             <a:endParaRPr lang="en-US" dirty="0"/>
           </a:p>
@@ -486,7 +486,7 @@
     </p:spTree>
     <p:extLst>
       <p:ext uri="{BB962C8B-B14F-4D97-AF65-F5344CB8AC3E}">
-        <p14:creationId xmlns:p14="http://schemas.microsoft.com/office/powerpoint/2010/main" xmlns="" val="1177722305"/>
+        <p14:creationId xmlns="" xmlns:p14="http://schemas.microsoft.com/office/powerpoint/2010/main" val="1177722305"/>
       </p:ext>
     </p:extLst>
   </p:cSld>
@@ -614,7 +614,7 @@
             <a:fld id="{37724C19-980F-4321-AACF-69E1510F1043}" type="datetimeFigureOut">
               <a:rPr lang="en-US" smtClean="0"/>
               <a:pPr/>
-              <a:t>11/21/2016</a:t>
+              <a:t>12/14/2016</a:t>
             </a:fld>
             <a:endParaRPr lang="en-US" dirty="0"/>
           </a:p>
@@ -666,7 +666,7 @@
     </p:spTree>
     <p:extLst>
       <p:ext uri="{BB962C8B-B14F-4D97-AF65-F5344CB8AC3E}">
-        <p14:creationId xmlns:p14="http://schemas.microsoft.com/office/powerpoint/2010/main" xmlns="" val="3097804831"/>
+        <p14:creationId xmlns="" xmlns:p14="http://schemas.microsoft.com/office/powerpoint/2010/main" val="3097804831"/>
       </p:ext>
     </p:extLst>
   </p:cSld>
@@ -784,7 +784,7 @@
             <a:fld id="{37724C19-980F-4321-AACF-69E1510F1043}" type="datetimeFigureOut">
               <a:rPr lang="en-US" smtClean="0"/>
               <a:pPr/>
-              <a:t>11/21/2016</a:t>
+              <a:t>12/14/2016</a:t>
             </a:fld>
             <a:endParaRPr lang="en-US" dirty="0"/>
           </a:p>
@@ -836,7 +836,7 @@
     </p:spTree>
     <p:extLst>
       <p:ext uri="{BB962C8B-B14F-4D97-AF65-F5344CB8AC3E}">
-        <p14:creationId xmlns:p14="http://schemas.microsoft.com/office/powerpoint/2010/main" xmlns="" val="137394816"/>
+        <p14:creationId xmlns="" xmlns:p14="http://schemas.microsoft.com/office/powerpoint/2010/main" val="137394816"/>
       </p:ext>
     </p:extLst>
   </p:cSld>
@@ -1031,7 +1031,7 @@
             <a:fld id="{37724C19-980F-4321-AACF-69E1510F1043}" type="datetimeFigureOut">
               <a:rPr lang="en-US" smtClean="0"/>
               <a:pPr/>
-              <a:t>11/21/2016</a:t>
+              <a:t>12/14/2016</a:t>
             </a:fld>
             <a:endParaRPr lang="en-US" dirty="0"/>
           </a:p>
@@ -1083,7 +1083,7 @@
     </p:spTree>
     <p:extLst>
       <p:ext uri="{BB962C8B-B14F-4D97-AF65-F5344CB8AC3E}">
-        <p14:creationId xmlns:p14="http://schemas.microsoft.com/office/powerpoint/2010/main" xmlns="" val="3748074609"/>
+        <p14:creationId xmlns="" xmlns:p14="http://schemas.microsoft.com/office/powerpoint/2010/main" val="3748074609"/>
       </p:ext>
     </p:extLst>
   </p:cSld>
@@ -1262,7 +1262,7 @@
             <a:fld id="{37724C19-980F-4321-AACF-69E1510F1043}" type="datetimeFigureOut">
               <a:rPr lang="en-US" smtClean="0"/>
               <a:pPr/>
-              <a:t>11/21/2016</a:t>
+              <a:t>12/14/2016</a:t>
             </a:fld>
             <a:endParaRPr lang="en-US" dirty="0"/>
           </a:p>
@@ -1314,7 +1314,7 @@
     </p:spTree>
     <p:extLst>
       <p:ext uri="{BB962C8B-B14F-4D97-AF65-F5344CB8AC3E}">
-        <p14:creationId xmlns:p14="http://schemas.microsoft.com/office/powerpoint/2010/main" xmlns="" val="1654182424"/>
+        <p14:creationId xmlns="" xmlns:p14="http://schemas.microsoft.com/office/powerpoint/2010/main" val="1654182424"/>
       </p:ext>
     </p:extLst>
   </p:cSld>
@@ -1628,7 +1628,7 @@
             <a:fld id="{37724C19-980F-4321-AACF-69E1510F1043}" type="datetimeFigureOut">
               <a:rPr lang="en-US" smtClean="0"/>
               <a:pPr/>
-              <a:t>11/21/2016</a:t>
+              <a:t>12/14/2016</a:t>
             </a:fld>
             <a:endParaRPr lang="en-US" dirty="0"/>
           </a:p>
@@ -1680,7 +1680,7 @@
     </p:spTree>
     <p:extLst>
       <p:ext uri="{BB962C8B-B14F-4D97-AF65-F5344CB8AC3E}">
-        <p14:creationId xmlns:p14="http://schemas.microsoft.com/office/powerpoint/2010/main" xmlns="" val="4245890323"/>
+        <p14:creationId xmlns="" xmlns:p14="http://schemas.microsoft.com/office/powerpoint/2010/main" val="4245890323"/>
       </p:ext>
     </p:extLst>
   </p:cSld>
@@ -1747,7 +1747,7 @@
             <a:fld id="{37724C19-980F-4321-AACF-69E1510F1043}" type="datetimeFigureOut">
               <a:rPr lang="en-US" smtClean="0"/>
               <a:pPr/>
-              <a:t>11/21/2016</a:t>
+              <a:t>12/14/2016</a:t>
             </a:fld>
             <a:endParaRPr lang="en-US" dirty="0"/>
           </a:p>
@@ -1799,7 +1799,7 @@
     </p:spTree>
     <p:extLst>
       <p:ext uri="{BB962C8B-B14F-4D97-AF65-F5344CB8AC3E}">
-        <p14:creationId xmlns:p14="http://schemas.microsoft.com/office/powerpoint/2010/main" xmlns="" val="4136871283"/>
+        <p14:creationId xmlns="" xmlns:p14="http://schemas.microsoft.com/office/powerpoint/2010/main" val="4136871283"/>
       </p:ext>
     </p:extLst>
   </p:cSld>
@@ -1844,7 +1844,7 @@
             <a:fld id="{37724C19-980F-4321-AACF-69E1510F1043}" type="datetimeFigureOut">
               <a:rPr lang="en-US" smtClean="0"/>
               <a:pPr/>
-              <a:t>11/21/2016</a:t>
+              <a:t>12/14/2016</a:t>
             </a:fld>
             <a:endParaRPr lang="en-US" dirty="0"/>
           </a:p>
@@ -1896,7 +1896,7 @@
     </p:spTree>
     <p:extLst>
       <p:ext uri="{BB962C8B-B14F-4D97-AF65-F5344CB8AC3E}">
-        <p14:creationId xmlns:p14="http://schemas.microsoft.com/office/powerpoint/2010/main" xmlns="" val="2409841877"/>
+        <p14:creationId xmlns="" xmlns:p14="http://schemas.microsoft.com/office/powerpoint/2010/main" val="2409841877"/>
       </p:ext>
     </p:extLst>
   </p:cSld>
@@ -2121,7 +2121,7 @@
             <a:fld id="{37724C19-980F-4321-AACF-69E1510F1043}" type="datetimeFigureOut">
               <a:rPr lang="en-US" smtClean="0"/>
               <a:pPr/>
-              <a:t>11/21/2016</a:t>
+              <a:t>12/14/2016</a:t>
             </a:fld>
             <a:endParaRPr lang="en-US" dirty="0"/>
           </a:p>
@@ -2173,7 +2173,7 @@
     </p:spTree>
     <p:extLst>
       <p:ext uri="{BB962C8B-B14F-4D97-AF65-F5344CB8AC3E}">
-        <p14:creationId xmlns:p14="http://schemas.microsoft.com/office/powerpoint/2010/main" xmlns="" val="827629637"/>
+        <p14:creationId xmlns="" xmlns:p14="http://schemas.microsoft.com/office/powerpoint/2010/main" val="827629637"/>
       </p:ext>
     </p:extLst>
   </p:cSld>
@@ -2375,7 +2375,7 @@
             <a:fld id="{37724C19-980F-4321-AACF-69E1510F1043}" type="datetimeFigureOut">
               <a:rPr lang="en-US" smtClean="0"/>
               <a:pPr/>
-              <a:t>11/21/2016</a:t>
+              <a:t>12/14/2016</a:t>
             </a:fld>
             <a:endParaRPr lang="en-US" dirty="0"/>
           </a:p>
@@ -2427,7 +2427,7 @@
     </p:spTree>
     <p:extLst>
       <p:ext uri="{BB962C8B-B14F-4D97-AF65-F5344CB8AC3E}">
-        <p14:creationId xmlns:p14="http://schemas.microsoft.com/office/powerpoint/2010/main" xmlns="" val="3514816148"/>
+        <p14:creationId xmlns="" xmlns:p14="http://schemas.microsoft.com/office/powerpoint/2010/main" val="3514816148"/>
       </p:ext>
     </p:extLst>
   </p:cSld>
@@ -2588,7 +2588,7 @@
             <a:fld id="{37724C19-980F-4321-AACF-69E1510F1043}" type="datetimeFigureOut">
               <a:rPr lang="en-US" smtClean="0"/>
               <a:pPr/>
-              <a:t>11/21/2016</a:t>
+              <a:t>12/14/2016</a:t>
             </a:fld>
             <a:endParaRPr lang="en-US" dirty="0"/>
           </a:p>
@@ -2676,7 +2676,7 @@
     </p:spTree>
     <p:extLst>
       <p:ext uri="{BB962C8B-B14F-4D97-AF65-F5344CB8AC3E}">
-        <p14:creationId xmlns:p14="http://schemas.microsoft.com/office/powerpoint/2010/main" xmlns="" val="4213530645"/>
+        <p14:creationId xmlns="" xmlns:p14="http://schemas.microsoft.com/office/powerpoint/2010/main" val="4213530645"/>
       </p:ext>
     </p:extLst>
   </p:cSld>
@@ -3829,7 +3829,7 @@
         </p:blipFill>
         <p:spPr bwMode="auto">
           <a:xfrm>
-            <a:off x="4819316" y="1179093"/>
+            <a:off x="7023897" y="1179093"/>
             <a:ext cx="372060" cy="347663"/>
           </a:xfrm>
           <a:prstGeom prst="rect">
@@ -3894,7 +3894,7 @@
     </p:spTree>
     <p:extLst>
       <p:ext uri="{BB962C8B-B14F-4D97-AF65-F5344CB8AC3E}">
-        <p14:creationId xmlns:p14="http://schemas.microsoft.com/office/powerpoint/2010/main" xmlns="" val="283767647"/>
+        <p14:creationId xmlns="" xmlns:p14="http://schemas.microsoft.com/office/powerpoint/2010/main" val="283767647"/>
       </p:ext>
     </p:extLst>
   </p:cSld>
@@ -3902,7 +3902,7 @@
     <a:masterClrMapping/>
   </p:clrMapOvr>
   <mc:AlternateContent xmlns:mc="http://schemas.openxmlformats.org/markup-compatibility/2006">
-    <mc:Choice xmlns:p14="http://schemas.microsoft.com/office/powerpoint/2010/main" xmlns="" Requires="p14">
+    <mc:Choice xmlns="" xmlns:p14="http://schemas.microsoft.com/office/powerpoint/2010/main" Requires="p14">
       <p:transition spd="slow" p14:dur="2000" advClick="0"/>
     </mc:Choice>
     <mc:Fallback>
@@ -5615,7 +5615,7 @@
     </p:spTree>
     <p:extLst>
       <p:ext uri="{BB962C8B-B14F-4D97-AF65-F5344CB8AC3E}">
-        <p14:creationId xmlns:p14="http://schemas.microsoft.com/office/powerpoint/2010/main" xmlns="" val="283767647"/>
+        <p14:creationId xmlns="" xmlns:p14="http://schemas.microsoft.com/office/powerpoint/2010/main" val="283767647"/>
       </p:ext>
     </p:extLst>
   </p:cSld>
@@ -5623,7 +5623,7 @@
     <a:masterClrMapping/>
   </p:clrMapOvr>
   <mc:AlternateContent xmlns:mc="http://schemas.openxmlformats.org/markup-compatibility/2006">
-    <mc:Choice xmlns:p14="http://schemas.microsoft.com/office/powerpoint/2010/main" xmlns="" Requires="p14">
+    <mc:Choice xmlns="" xmlns:p14="http://schemas.microsoft.com/office/powerpoint/2010/main" Requires="p14">
       <p:transition spd="slow" p14:dur="2000" advClick="0"/>
     </mc:Choice>
     <mc:Fallback>
@@ -7759,7 +7759,7 @@
     </p:spTree>
     <p:extLst>
       <p:ext uri="{BB962C8B-B14F-4D97-AF65-F5344CB8AC3E}">
-        <p14:creationId xmlns:p14="http://schemas.microsoft.com/office/powerpoint/2010/main" xmlns="" val="283767647"/>
+        <p14:creationId xmlns="" xmlns:p14="http://schemas.microsoft.com/office/powerpoint/2010/main" val="283767647"/>
       </p:ext>
     </p:extLst>
   </p:cSld>
@@ -7767,7 +7767,7 @@
     <a:masterClrMapping/>
   </p:clrMapOvr>
   <mc:AlternateContent xmlns:mc="http://schemas.openxmlformats.org/markup-compatibility/2006">
-    <mc:Choice xmlns:p14="http://schemas.microsoft.com/office/powerpoint/2010/main" xmlns="" Requires="p14">
+    <mc:Choice xmlns="" xmlns:p14="http://schemas.microsoft.com/office/powerpoint/2010/main" Requires="p14">
       <p:transition spd="slow" p14:dur="2000" advClick="0"/>
     </mc:Choice>
     <mc:Fallback>
@@ -8783,7 +8783,7 @@
         </p:blipFill>
         <p:spPr bwMode="auto">
           <a:xfrm>
-            <a:off x="4819316" y="1179093"/>
+            <a:off x="7061475" y="1166567"/>
             <a:ext cx="372060" cy="347663"/>
           </a:xfrm>
           <a:prstGeom prst="rect">
@@ -8800,14 +8800,14 @@
       </p:pic>
       <p:sp>
         <p:nvSpPr>
-          <p:cNvPr id="25" name="24 Rectángulo"/>
-          <p:cNvSpPr/>
-          <p:nvPr/>
-        </p:nvSpPr>
-        <p:spPr>
-          <a:xfrm>
-            <a:off x="4796589" y="1499938"/>
-            <a:ext cx="1981200" cy="1564104"/>
+          <p:cNvPr id="27" name="26 Rectángulo"/>
+          <p:cNvSpPr/>
+          <p:nvPr/>
+        </p:nvSpPr>
+        <p:spPr>
+          <a:xfrm>
+            <a:off x="5385313" y="1495433"/>
+            <a:ext cx="1981200" cy="521367"/>
           </a:xfrm>
           <a:prstGeom prst="rect">
             <a:avLst/>
@@ -8851,13 +8851,15 @@
       </p:sp>
       <p:sp>
         <p:nvSpPr>
-          <p:cNvPr id="27" name="26 Rectángulo"/>
-          <p:cNvSpPr/>
-          <p:nvPr/>
-        </p:nvSpPr>
-        <p:spPr>
-          <a:xfrm>
-            <a:off x="4796589" y="1507959"/>
+          <p:cNvPr id="28" name="27 Rectángulo">
+            <a:hlinkClick r:id="rId7" action="ppaction://hlinksldjump"/>
+          </p:cNvPr>
+          <p:cNvSpPr/>
+          <p:nvPr/>
+        </p:nvSpPr>
+        <p:spPr>
+          <a:xfrm>
+            <a:off x="5368281" y="2021306"/>
             <a:ext cx="1981200" cy="521367"/>
           </a:xfrm>
           <a:prstGeom prst="rect">
@@ -8902,15 +8904,15 @@
       </p:sp>
       <p:sp>
         <p:nvSpPr>
-          <p:cNvPr id="28" name="27 Rectángulo">
-            <a:hlinkClick r:id="rId7" action="ppaction://hlinksldjump"/>
+          <p:cNvPr id="31" name="30 Rectángulo">
+            <a:hlinkClick r:id="rId8" action="ppaction://hlinksldjump"/>
           </p:cNvPr>
           <p:cNvSpPr/>
           <p:nvPr/>
         </p:nvSpPr>
         <p:spPr>
           <a:xfrm>
-            <a:off x="4804610" y="2021306"/>
+            <a:off x="5360260" y="2550696"/>
             <a:ext cx="1981200" cy="521367"/>
           </a:xfrm>
           <a:prstGeom prst="rect">
@@ -8955,7 +8957,173 @@
       </p:sp>
       <p:sp>
         <p:nvSpPr>
-          <p:cNvPr id="31" name="30 Rectángulo">
+          <p:cNvPr id="35" name="Rectangle 12">
+            <a:hlinkClick r:id="rId5" action="ppaction://hlinksldjump"/>
+          </p:cNvPr>
+          <p:cNvSpPr/>
+          <p:nvPr/>
+        </p:nvSpPr>
+        <p:spPr>
+          <a:xfrm>
+            <a:off x="5448492" y="1608814"/>
+            <a:ext cx="1820779" cy="370800"/>
+          </a:xfrm>
+          <a:prstGeom prst="rect">
+            <a:avLst/>
+          </a:prstGeom>
+          <a:noFill/>
+          <a:ln>
+            <a:noFill/>
+          </a:ln>
+        </p:spPr>
+        <p:style>
+          <a:lnRef idx="2">
+            <a:schemeClr val="dk1"/>
+          </a:lnRef>
+          <a:fillRef idx="1">
+            <a:schemeClr val="lt1"/>
+          </a:fillRef>
+          <a:effectRef idx="0">
+            <a:schemeClr val="dk1"/>
+          </a:effectRef>
+          <a:fontRef idx="minor">
+            <a:schemeClr val="dk1"/>
+          </a:fontRef>
+        </p:style>
+        <p:txBody>
+          <a:bodyPr rtlCol="0" anchor="ctr"/>
+          <a:lstStyle/>
+          <a:p>
+            <a:pPr algn="ctr"/>
+            <a:r>
+              <a:rPr lang="en-GB" sz="1100" dirty="0" smtClean="0">
+                <a:solidFill>
+                  <a:schemeClr val="bg1"/>
+                </a:solidFill>
+              </a:rPr>
+              <a:t>Quiz</a:t>
+            </a:r>
+            <a:endParaRPr lang="en-GB" sz="1100" dirty="0" smtClean="0">
+              <a:solidFill>
+                <a:schemeClr val="bg1"/>
+              </a:solidFill>
+            </a:endParaRPr>
+          </a:p>
+        </p:txBody>
+      </p:sp>
+      <p:sp>
+        <p:nvSpPr>
+          <p:cNvPr id="36" name="Rectangle 12">
+            <a:hlinkClick r:id="rId5" action="ppaction://hlinksldjump"/>
+          </p:cNvPr>
+          <p:cNvSpPr/>
+          <p:nvPr/>
+        </p:nvSpPr>
+        <p:spPr>
+          <a:xfrm>
+            <a:off x="5657479" y="2114140"/>
+            <a:ext cx="1403684" cy="370800"/>
+          </a:xfrm>
+          <a:prstGeom prst="rect">
+            <a:avLst/>
+          </a:prstGeom>
+          <a:noFill/>
+          <a:ln>
+            <a:noFill/>
+          </a:ln>
+        </p:spPr>
+        <p:style>
+          <a:lnRef idx="2">
+            <a:schemeClr val="dk1"/>
+          </a:lnRef>
+          <a:fillRef idx="1">
+            <a:schemeClr val="lt1"/>
+          </a:fillRef>
+          <a:effectRef idx="0">
+            <a:schemeClr val="dk1"/>
+          </a:effectRef>
+          <a:fontRef idx="minor">
+            <a:schemeClr val="dk1"/>
+          </a:fontRef>
+        </p:style>
+        <p:txBody>
+          <a:bodyPr rtlCol="0" anchor="ctr"/>
+          <a:lstStyle/>
+          <a:p>
+            <a:pPr algn="ctr"/>
+            <a:r>
+              <a:rPr lang="en-GB" sz="1100" dirty="0" smtClean="0">
+                <a:solidFill>
+                  <a:schemeClr val="bg1"/>
+                </a:solidFill>
+              </a:rPr>
+              <a:t>Map statistics</a:t>
+            </a:r>
+          </a:p>
+        </p:txBody>
+      </p:sp>
+      <p:sp>
+        <p:nvSpPr>
+          <p:cNvPr id="37" name="Rectangle 12">
+            <a:hlinkClick r:id="rId5" action="ppaction://hlinksldjump"/>
+          </p:cNvPr>
+          <p:cNvSpPr/>
+          <p:nvPr/>
+        </p:nvSpPr>
+        <p:spPr>
+          <a:xfrm>
+            <a:off x="5413880" y="2595404"/>
+            <a:ext cx="1820779" cy="370800"/>
+          </a:xfrm>
+          <a:prstGeom prst="rect">
+            <a:avLst/>
+          </a:prstGeom>
+          <a:noFill/>
+          <a:ln>
+            <a:noFill/>
+          </a:ln>
+        </p:spPr>
+        <p:style>
+          <a:lnRef idx="2">
+            <a:schemeClr val="dk1"/>
+          </a:lnRef>
+          <a:fillRef idx="1">
+            <a:schemeClr val="lt1"/>
+          </a:fillRef>
+          <a:effectRef idx="0">
+            <a:schemeClr val="dk1"/>
+          </a:effectRef>
+          <a:fontRef idx="minor">
+            <a:schemeClr val="dk1"/>
+          </a:fontRef>
+        </p:style>
+        <p:txBody>
+          <a:bodyPr rtlCol="0" anchor="ctr"/>
+          <a:lstStyle/>
+          <a:p>
+            <a:pPr algn="ctr"/>
+            <a:r>
+              <a:rPr lang="en-GB" sz="1100" dirty="0" smtClean="0">
+                <a:solidFill>
+                  <a:schemeClr val="bg1"/>
+                </a:solidFill>
+              </a:rPr>
+              <a:t>Survival </a:t>
+            </a:r>
+            <a:r>
+              <a:rPr lang="en-GB" sz="1100" dirty="0" smtClean="0">
+                <a:solidFill>
+                  <a:schemeClr val="bg1"/>
+                </a:solidFill>
+              </a:rPr>
+              <a:t>tips</a:t>
+            </a:r>
+          </a:p>
+        </p:txBody>
+      </p:sp>
+      <p:sp>
+        <p:nvSpPr>
+          <p:cNvPr id="38" name="37 Rectángulo">
             <a:hlinkClick r:id="rId8" action="ppaction://hlinksldjump"/>
           </p:cNvPr>
           <p:cNvSpPr/>
@@ -8963,7 +9131,7 @@
         </p:nvSpPr>
         <p:spPr>
           <a:xfrm>
-            <a:off x="4796589" y="2550696"/>
+            <a:off x="5387400" y="3041298"/>
             <a:ext cx="1981200" cy="521367"/>
           </a:xfrm>
           <a:prstGeom prst="rect">
@@ -9008,7 +9176,7 @@
       </p:sp>
       <p:sp>
         <p:nvSpPr>
-          <p:cNvPr id="35" name="Rectangle 12">
+          <p:cNvPr id="42" name="Rectangle 12">
             <a:hlinkClick r:id="rId5" action="ppaction://hlinksldjump"/>
           </p:cNvPr>
           <p:cNvSpPr/>
@@ -9016,7 +9184,7 @@
         </p:nvSpPr>
         <p:spPr>
           <a:xfrm>
-            <a:off x="4884821" y="1608814"/>
+            <a:off x="5428494" y="3098532"/>
             <a:ext cx="1820779" cy="370800"/>
           </a:xfrm>
           <a:prstGeom prst="rect">
@@ -9052,117 +9220,20 @@
                   <a:schemeClr val="bg1"/>
                 </a:solidFill>
               </a:rPr>
-              <a:t>Answer quiz</a:t>
-            </a:r>
-          </a:p>
-        </p:txBody>
-      </p:sp>
-      <p:sp>
-        <p:nvSpPr>
-          <p:cNvPr id="36" name="Rectangle 12">
-            <a:hlinkClick r:id="rId5" action="ppaction://hlinksldjump"/>
-          </p:cNvPr>
-          <p:cNvSpPr/>
-          <p:nvPr/>
-        </p:nvSpPr>
-        <p:spPr>
-          <a:xfrm>
-            <a:off x="4981074" y="2114140"/>
-            <a:ext cx="1403684" cy="370800"/>
-          </a:xfrm>
-          <a:prstGeom prst="rect">
-            <a:avLst/>
-          </a:prstGeom>
-          <a:noFill/>
-          <a:ln>
-            <a:noFill/>
-          </a:ln>
-        </p:spPr>
-        <p:style>
-          <a:lnRef idx="2">
-            <a:schemeClr val="dk1"/>
-          </a:lnRef>
-          <a:fillRef idx="1">
-            <a:schemeClr val="lt1"/>
-          </a:fillRef>
-          <a:effectRef idx="0">
-            <a:schemeClr val="dk1"/>
-          </a:effectRef>
-          <a:fontRef idx="minor">
-            <a:schemeClr val="dk1"/>
-          </a:fontRef>
-        </p:style>
-        <p:txBody>
-          <a:bodyPr rtlCol="0" anchor="ctr"/>
-          <a:lstStyle/>
-          <a:p>
-            <a:pPr algn="ctr"/>
-            <a:r>
-              <a:rPr lang="en-GB" sz="1100" dirty="0" smtClean="0">
-                <a:solidFill>
-                  <a:schemeClr val="bg1"/>
-                </a:solidFill>
-              </a:rPr>
-              <a:t>Map statistics</a:t>
-            </a:r>
-          </a:p>
-        </p:txBody>
-      </p:sp>
-      <p:sp>
-        <p:nvSpPr>
-          <p:cNvPr id="37" name="Rectangle 12">
-            <a:hlinkClick r:id="rId5" action="ppaction://hlinksldjump"/>
-          </p:cNvPr>
-          <p:cNvSpPr/>
-          <p:nvPr/>
-        </p:nvSpPr>
-        <p:spPr>
-          <a:xfrm>
-            <a:off x="4812631" y="2595404"/>
-            <a:ext cx="1820779" cy="370800"/>
-          </a:xfrm>
-          <a:prstGeom prst="rect">
-            <a:avLst/>
-          </a:prstGeom>
-          <a:noFill/>
-          <a:ln>
-            <a:noFill/>
-          </a:ln>
-        </p:spPr>
-        <p:style>
-          <a:lnRef idx="2">
-            <a:schemeClr val="dk1"/>
-          </a:lnRef>
-          <a:fillRef idx="1">
-            <a:schemeClr val="lt1"/>
-          </a:fillRef>
-          <a:effectRef idx="0">
-            <a:schemeClr val="dk1"/>
-          </a:effectRef>
-          <a:fontRef idx="minor">
-            <a:schemeClr val="dk1"/>
-          </a:fontRef>
-        </p:style>
-        <p:txBody>
-          <a:bodyPr rtlCol="0" anchor="ctr"/>
-          <a:lstStyle/>
-          <a:p>
-            <a:pPr algn="ctr"/>
-            <a:r>
-              <a:rPr lang="en-GB" sz="1100" dirty="0" smtClean="0">
-                <a:solidFill>
-                  <a:schemeClr val="bg1"/>
-                </a:solidFill>
-              </a:rPr>
-              <a:t>Disaster Survival tips</a:t>
-            </a:r>
+              <a:t>Settings</a:t>
+            </a:r>
+            <a:endParaRPr lang="en-GB" sz="1100" dirty="0" smtClean="0">
+              <a:solidFill>
+                <a:schemeClr val="bg1"/>
+              </a:solidFill>
+            </a:endParaRPr>
           </a:p>
         </p:txBody>
       </p:sp>
     </p:spTree>
     <p:extLst>
       <p:ext uri="{BB962C8B-B14F-4D97-AF65-F5344CB8AC3E}">
-        <p14:creationId xmlns:p14="http://schemas.microsoft.com/office/powerpoint/2010/main" xmlns="" val="283767647"/>
+        <p14:creationId xmlns="" xmlns:p14="http://schemas.microsoft.com/office/powerpoint/2010/main" val="283767647"/>
       </p:ext>
     </p:extLst>
   </p:cSld>
@@ -9170,7 +9241,7 @@
     <a:masterClrMapping/>
   </p:clrMapOvr>
   <mc:AlternateContent xmlns:mc="http://schemas.openxmlformats.org/markup-compatibility/2006">
-    <mc:Choice xmlns:p14="http://schemas.microsoft.com/office/powerpoint/2010/main" xmlns="" Requires="p14">
+    <mc:Choice xmlns="" xmlns:p14="http://schemas.microsoft.com/office/powerpoint/2010/main" Requires="p14">
       <p:transition spd="slow" p14:dur="2000" advClick="0"/>
     </mc:Choice>
     <mc:Fallback>
@@ -10066,7 +10137,7 @@
     </p:spTree>
     <p:extLst>
       <p:ext uri="{BB962C8B-B14F-4D97-AF65-F5344CB8AC3E}">
-        <p14:creationId xmlns:p14="http://schemas.microsoft.com/office/powerpoint/2010/main" xmlns="" val="283767647"/>
+        <p14:creationId xmlns="" xmlns:p14="http://schemas.microsoft.com/office/powerpoint/2010/main" val="283767647"/>
       </p:ext>
     </p:extLst>
   </p:cSld>
@@ -10074,7 +10145,7 @@
     <a:masterClrMapping/>
   </p:clrMapOvr>
   <mc:AlternateContent xmlns:mc="http://schemas.openxmlformats.org/markup-compatibility/2006">
-    <mc:Choice xmlns:p14="http://schemas.microsoft.com/office/powerpoint/2010/main" xmlns="" Requires="p14">
+    <mc:Choice xmlns="" xmlns:p14="http://schemas.microsoft.com/office/powerpoint/2010/main" Requires="p14">
       <p:transition spd="slow" p14:dur="2000" advClick="0"/>
     </mc:Choice>
     <mc:Fallback>
@@ -10874,7 +10945,7 @@
     </p:spTree>
     <p:extLst>
       <p:ext uri="{BB962C8B-B14F-4D97-AF65-F5344CB8AC3E}">
-        <p14:creationId xmlns:p14="http://schemas.microsoft.com/office/powerpoint/2010/main" xmlns="" val="283767647"/>
+        <p14:creationId xmlns="" xmlns:p14="http://schemas.microsoft.com/office/powerpoint/2010/main" val="283767647"/>
       </p:ext>
     </p:extLst>
   </p:cSld>
@@ -10882,7 +10953,7 @@
     <a:masterClrMapping/>
   </p:clrMapOvr>
   <mc:AlternateContent xmlns:mc="http://schemas.openxmlformats.org/markup-compatibility/2006">
-    <mc:Choice xmlns:p14="http://schemas.microsoft.com/office/powerpoint/2010/main" xmlns="" Requires="p14">
+    <mc:Choice xmlns="" xmlns:p14="http://schemas.microsoft.com/office/powerpoint/2010/main" Requires="p14">
       <p:transition spd="slow" p14:dur="2000" advClick="0"/>
     </mc:Choice>
     <mc:Fallback>
@@ -11640,7 +11711,7 @@
     </p:spTree>
     <p:extLst>
       <p:ext uri="{BB962C8B-B14F-4D97-AF65-F5344CB8AC3E}">
-        <p14:creationId xmlns:p14="http://schemas.microsoft.com/office/powerpoint/2010/main" xmlns="" val="283767647"/>
+        <p14:creationId xmlns="" xmlns:p14="http://schemas.microsoft.com/office/powerpoint/2010/main" val="283767647"/>
       </p:ext>
     </p:extLst>
   </p:cSld>
@@ -11648,7 +11719,7 @@
     <a:masterClrMapping/>
   </p:clrMapOvr>
   <mc:AlternateContent xmlns:mc="http://schemas.openxmlformats.org/markup-compatibility/2006">
-    <mc:Choice xmlns:p14="http://schemas.microsoft.com/office/powerpoint/2010/main" xmlns="" Requires="p14">
+    <mc:Choice xmlns="" xmlns:p14="http://schemas.microsoft.com/office/powerpoint/2010/main" Requires="p14">
       <p:transition spd="slow" p14:dur="2000" advClick="0"/>
     </mc:Choice>
     <mc:Fallback>
@@ -12570,7 +12641,7 @@
     </p:spTree>
     <p:extLst>
       <p:ext uri="{BB962C8B-B14F-4D97-AF65-F5344CB8AC3E}">
-        <p14:creationId xmlns:p14="http://schemas.microsoft.com/office/powerpoint/2010/main" xmlns="" val="283767647"/>
+        <p14:creationId xmlns="" xmlns:p14="http://schemas.microsoft.com/office/powerpoint/2010/main" val="283767647"/>
       </p:ext>
     </p:extLst>
   </p:cSld>
@@ -12578,7 +12649,7 @@
     <a:masterClrMapping/>
   </p:clrMapOvr>
   <mc:AlternateContent xmlns:mc="http://schemas.openxmlformats.org/markup-compatibility/2006">
-    <mc:Choice xmlns:p14="http://schemas.microsoft.com/office/powerpoint/2010/main" xmlns="" Requires="p14">
+    <mc:Choice xmlns="" xmlns:p14="http://schemas.microsoft.com/office/powerpoint/2010/main" Requires="p14">
       <p:transition spd="slow" p14:dur="2000" advClick="0"/>
     </mc:Choice>
     <mc:Fallback>
@@ -13506,7 +13577,7 @@
     </p:spTree>
     <p:extLst>
       <p:ext uri="{BB962C8B-B14F-4D97-AF65-F5344CB8AC3E}">
-        <p14:creationId xmlns:p14="http://schemas.microsoft.com/office/powerpoint/2010/main" xmlns="" val="283767647"/>
+        <p14:creationId xmlns="" xmlns:p14="http://schemas.microsoft.com/office/powerpoint/2010/main" val="283767647"/>
       </p:ext>
     </p:extLst>
   </p:cSld>
@@ -13514,7 +13585,7 @@
     <a:masterClrMapping/>
   </p:clrMapOvr>
   <mc:AlternateContent xmlns:mc="http://schemas.openxmlformats.org/markup-compatibility/2006">
-    <mc:Choice xmlns:p14="http://schemas.microsoft.com/office/powerpoint/2010/main" xmlns="" Requires="p14">
+    <mc:Choice xmlns="" xmlns:p14="http://schemas.microsoft.com/office/powerpoint/2010/main" Requires="p14">
       <p:transition spd="slow" p14:dur="2000" advClick="0"/>
     </mc:Choice>
     <mc:Fallback>
@@ -14330,7 +14401,7 @@
     </p:spTree>
     <p:extLst>
       <p:ext uri="{BB962C8B-B14F-4D97-AF65-F5344CB8AC3E}">
-        <p14:creationId xmlns:p14="http://schemas.microsoft.com/office/powerpoint/2010/main" xmlns="" val="283767647"/>
+        <p14:creationId xmlns="" xmlns:p14="http://schemas.microsoft.com/office/powerpoint/2010/main" val="283767647"/>
       </p:ext>
     </p:extLst>
   </p:cSld>
@@ -14338,7 +14409,7 @@
     <a:masterClrMapping/>
   </p:clrMapOvr>
   <mc:AlternateContent xmlns:mc="http://schemas.openxmlformats.org/markup-compatibility/2006">
-    <mc:Choice xmlns:p14="http://schemas.microsoft.com/office/powerpoint/2010/main" xmlns="" Requires="p14">
+    <mc:Choice xmlns="" xmlns:p14="http://schemas.microsoft.com/office/powerpoint/2010/main" Requires="p14">
       <p:transition spd="slow" p14:dur="2000" advClick="0"/>
     </mc:Choice>
     <mc:Fallback>
@@ -15154,7 +15225,7 @@
     </p:spTree>
     <p:extLst>
       <p:ext uri="{BB962C8B-B14F-4D97-AF65-F5344CB8AC3E}">
-        <p14:creationId xmlns:p14="http://schemas.microsoft.com/office/powerpoint/2010/main" xmlns="" val="283767647"/>
+        <p14:creationId xmlns="" xmlns:p14="http://schemas.microsoft.com/office/powerpoint/2010/main" val="283767647"/>
       </p:ext>
     </p:extLst>
   </p:cSld>
@@ -15162,7 +15233,7 @@
     <a:masterClrMapping/>
   </p:clrMapOvr>
   <mc:AlternateContent xmlns:mc="http://schemas.openxmlformats.org/markup-compatibility/2006">
-    <mc:Choice xmlns:p14="http://schemas.microsoft.com/office/powerpoint/2010/main" xmlns="" Requires="p14">
+    <mc:Choice xmlns="" xmlns:p14="http://schemas.microsoft.com/office/powerpoint/2010/main" Requires="p14">
       <p:transition spd="slow" p14:dur="2000" advClick="0"/>
     </mc:Choice>
     <mc:Fallback>
@@ -15468,7 +15539,7 @@
   <a:extraClrSchemeLst/>
   <a:extLst>
     <a:ext uri="{05A4C25C-085E-4340-85A3-A5531E510DB2}">
-      <thm15:themeFamily xmlns:thm15="http://schemas.microsoft.com/office/thememl/2012/main" xmlns="" name="Office Theme" id="{62F939B6-93AF-4DB8-9C6B-D6C7DFDC589F}" vid="{4A3C46E8-61CC-4603-A589-7422A47A8E4A}"/>
+      <thm15:themeFamily xmlns="" xmlns:thm15="http://schemas.microsoft.com/office/thememl/2012/main" name="Office Theme" id="{62F939B6-93AF-4DB8-9C6B-D6C7DFDC589F}" vid="{4A3C46E8-61CC-4603-A589-7422A47A8E4A}"/>
     </a:ext>
   </a:extLst>
 </a:theme>

</xml_diff>